<commit_message>
update documentation, run mcmc for her_mature_catch
</commit_message>
<xml_diff>
--- a/technical_docs/folder_organization.pptx
+++ b/technical_docs/folder_organization.pptx
@@ -9,7 +9,9 @@
     <p:sldId id="274" r:id="rId3"/>
     <p:sldId id="277" r:id="rId4"/>
     <p:sldId id="275" r:id="rId5"/>
-    <p:sldId id="276" r:id="rId6"/>
+    <p:sldId id="280" r:id="rId6"/>
+    <p:sldId id="276" r:id="rId7"/>
+    <p:sldId id="281" r:id="rId8"/>
   </p:sldIdLst>
   <p:sldSz cx="12192000" cy="6858000"/>
   <p:notesSz cx="6858000" cy="9144000"/>
@@ -108,6 +110,11 @@
       </a:defRPr>
     </a:lvl9pPr>
   </p:defaultTextStyle>
+  <p:extLst>
+    <p:ext uri="{EFAFB233-063F-42B5-8137-9DF3F51BA10A}">
+      <p15:sldGuideLst xmlns:p15="http://schemas.microsoft.com/office/powerpoint/2012/main"/>
+    </p:ext>
+  </p:extLst>
 </p:presentation>
 </file>
 
@@ -258,7 +265,7 @@
           <a:p>
             <a:fld id="{D47E9853-2AE6-41F0-B651-A793F45B94C7}" type="datetimeFigureOut">
               <a:rPr lang="en-US" smtClean="0"/>
-              <a:t>7/16/2019</a:t>
+              <a:t>6/10/2020</a:t>
             </a:fld>
             <a:endParaRPr lang="en-US"/>
           </a:p>
@@ -456,7 +463,7 @@
           <a:p>
             <a:fld id="{D47E9853-2AE6-41F0-B651-A793F45B94C7}" type="datetimeFigureOut">
               <a:rPr lang="en-US" smtClean="0"/>
-              <a:t>7/16/2019</a:t>
+              <a:t>6/10/2020</a:t>
             </a:fld>
             <a:endParaRPr lang="en-US"/>
           </a:p>
@@ -664,7 +671,7 @@
           <a:p>
             <a:fld id="{D47E9853-2AE6-41F0-B651-A793F45B94C7}" type="datetimeFigureOut">
               <a:rPr lang="en-US" smtClean="0"/>
-              <a:t>7/16/2019</a:t>
+              <a:t>6/10/2020</a:t>
             </a:fld>
             <a:endParaRPr lang="en-US"/>
           </a:p>
@@ -862,7 +869,7 @@
           <a:p>
             <a:fld id="{D47E9853-2AE6-41F0-B651-A793F45B94C7}" type="datetimeFigureOut">
               <a:rPr lang="en-US" smtClean="0"/>
-              <a:t>7/16/2019</a:t>
+              <a:t>6/10/2020</a:t>
             </a:fld>
             <a:endParaRPr lang="en-US"/>
           </a:p>
@@ -1137,7 +1144,7 @@
           <a:p>
             <a:fld id="{D47E9853-2AE6-41F0-B651-A793F45B94C7}" type="datetimeFigureOut">
               <a:rPr lang="en-US" smtClean="0"/>
-              <a:t>7/16/2019</a:t>
+              <a:t>6/10/2020</a:t>
             </a:fld>
             <a:endParaRPr lang="en-US"/>
           </a:p>
@@ -1402,7 +1409,7 @@
           <a:p>
             <a:fld id="{D47E9853-2AE6-41F0-B651-A793F45B94C7}" type="datetimeFigureOut">
               <a:rPr lang="en-US" smtClean="0"/>
-              <a:t>7/16/2019</a:t>
+              <a:t>6/10/2020</a:t>
             </a:fld>
             <a:endParaRPr lang="en-US"/>
           </a:p>
@@ -1814,7 +1821,7 @@
           <a:p>
             <a:fld id="{D47E9853-2AE6-41F0-B651-A793F45B94C7}" type="datetimeFigureOut">
               <a:rPr lang="en-US" smtClean="0"/>
-              <a:t>7/16/2019</a:t>
+              <a:t>6/10/2020</a:t>
             </a:fld>
             <a:endParaRPr lang="en-US"/>
           </a:p>
@@ -1955,7 +1962,7 @@
           <a:p>
             <a:fld id="{D47E9853-2AE6-41F0-B651-A793F45B94C7}" type="datetimeFigureOut">
               <a:rPr lang="en-US" smtClean="0"/>
-              <a:t>7/16/2019</a:t>
+              <a:t>6/10/2020</a:t>
             </a:fld>
             <a:endParaRPr lang="en-US"/>
           </a:p>
@@ -2068,7 +2075,7 @@
           <a:p>
             <a:fld id="{D47E9853-2AE6-41F0-B651-A793F45B94C7}" type="datetimeFigureOut">
               <a:rPr lang="en-US" smtClean="0"/>
-              <a:t>7/16/2019</a:t>
+              <a:t>6/10/2020</a:t>
             </a:fld>
             <a:endParaRPr lang="en-US"/>
           </a:p>
@@ -2379,7 +2386,7 @@
           <a:p>
             <a:fld id="{D47E9853-2AE6-41F0-B651-A793F45B94C7}" type="datetimeFigureOut">
               <a:rPr lang="en-US" smtClean="0"/>
-              <a:t>7/16/2019</a:t>
+              <a:t>6/10/2020</a:t>
             </a:fld>
             <a:endParaRPr lang="en-US"/>
           </a:p>
@@ -2667,7 +2674,7 @@
           <a:p>
             <a:fld id="{D47E9853-2AE6-41F0-B651-A793F45B94C7}" type="datetimeFigureOut">
               <a:rPr lang="en-US" smtClean="0"/>
-              <a:t>7/16/2019</a:t>
+              <a:t>6/10/2020</a:t>
             </a:fld>
             <a:endParaRPr lang="en-US"/>
           </a:p>
@@ -2908,7 +2915,7 @@
           <a:p>
             <a:fld id="{D47E9853-2AE6-41F0-B651-A793F45B94C7}" type="datetimeFigureOut">
               <a:rPr lang="en-US" smtClean="0"/>
-              <a:t>7/16/2019</a:t>
+              <a:t>6/10/2020</a:t>
             </a:fld>
             <a:endParaRPr lang="en-US"/>
           </a:p>
@@ -3386,7 +3393,7 @@
           <a:p>
             <a:r>
               <a:rPr lang="en-US" dirty="0"/>
-              <a:t>Updated 2019-07-16</a:t>
+              <a:t>Updated June 2020</a:t>
             </a:r>
           </a:p>
         </p:txBody>
@@ -3435,8 +3442,8 @@
         </p:nvSpPr>
         <p:spPr>
           <a:xfrm>
-            <a:off x="2174750" y="534504"/>
-            <a:ext cx="7508344" cy="4490845"/>
+            <a:off x="1538646" y="494747"/>
+            <a:ext cx="9738954" cy="5957015"/>
           </a:xfrm>
           <a:prstGeom prst="rect">
             <a:avLst/>
@@ -3494,13 +3501,17 @@
             </a:r>
             <a:r>
               <a:rPr lang="en-US" sz="1588" b="1" dirty="0"/>
-              <a:t>_### = HER model with best-fitting parameterization of LS model by </a:t>
-            </a:r>
-            <a:r>
-              <a:rPr lang="en-US" sz="1588" b="1" dirty="0" err="1"/>
+              <a:t>_### </a:t>
+            </a:r>
+            <a:r>
+              <a:rPr lang="en-US" sz="1588" dirty="0"/>
+              <a:t>= HER model with best-fitting parameterization of LS model by </a:t>
+            </a:r>
+            <a:r>
+              <a:rPr lang="en-US" sz="1588" dirty="0" err="1"/>
               <a:t>AICc</a:t>
             </a:r>
-            <a:endParaRPr lang="en-US" sz="1588" b="1" dirty="0"/>
+            <a:endParaRPr lang="en-US" sz="1588" dirty="0"/>
           </a:p>
           <a:p>
             <a:endParaRPr lang="en-US" sz="1588" b="1" dirty="0"/>
@@ -3512,7 +3523,11 @@
             </a:r>
             <a:r>
               <a:rPr lang="en-US" sz="1588" b="1" dirty="0"/>
-              <a:t>.#_### = HER model with best-fitting parameterization of HER by AIC when conditioned on catch</a:t>
+              <a:t>.#_### </a:t>
+            </a:r>
+            <a:r>
+              <a:rPr lang="en-US" sz="1588" dirty="0"/>
+              <a:t>= HER model with best-fitting parameterization of HER by AIC when conditioned on catch</a:t>
             </a:r>
           </a:p>
           <a:p>
@@ -3525,11 +3540,68 @@
             </a:r>
             <a:r>
               <a:rPr lang="en-US" sz="1588" b="1" dirty="0"/>
-              <a:t>.#_### = HER model with best-fitting parameterization of HER by AIC when conditioned on effort</a:t>
-            </a:r>
+              <a:t>.#_### </a:t>
+            </a:r>
+            <a:r>
+              <a:rPr lang="en-US" sz="1588" dirty="0"/>
+              <a:t>= HER model with best-fitting parameterization of HER by AIC when conditioned on effort</a:t>
+            </a:r>
+          </a:p>
+          <a:p>
+            <a:endParaRPr lang="en-US" sz="1588" dirty="0"/>
+          </a:p>
+          <a:p>
+            <a:r>
+              <a:rPr lang="en-US" sz="1588" b="1" dirty="0"/>
+              <a:t>HER_condEffort_fixedmat.4_3 </a:t>
+            </a:r>
+            <a:r>
+              <a:rPr lang="en-US" sz="1588" dirty="0"/>
+              <a:t>= HER model conditioned on effort with a50 fixed at 3.67 (form </a:t>
+            </a:r>
+            <a:r>
+              <a:rPr lang="en-US" sz="1588" dirty="0" err="1"/>
+              <a:t>FishLife</a:t>
+            </a:r>
+            <a:r>
+              <a:rPr lang="en-US" sz="1588" dirty="0"/>
+              <a:t>) and a95 = 4.48 from regression provided by SD. One time block for selectivity, 3 blocks estimated for </a:t>
+            </a:r>
+            <a:r>
+              <a:rPr lang="en-US" sz="1588" dirty="0" err="1"/>
+              <a:t>survial</a:t>
+            </a:r>
+            <a:endParaRPr lang="en-US" sz="1588" dirty="0"/>
           </a:p>
           <a:p>
             <a:endParaRPr lang="en-US" sz="1588" b="1" dirty="0"/>
+          </a:p>
+          <a:p>
+            <a:r>
+              <a:rPr lang="en-US" sz="1588" b="1" dirty="0"/>
+              <a:t>HER_confEffort_1929 </a:t>
+            </a:r>
+            <a:r>
+              <a:rPr lang="en-US" sz="1588" dirty="0"/>
+              <a:t>= HER model conditioned on effort with data file going back to 1929. Still exploratory, not running well</a:t>
+            </a:r>
+          </a:p>
+          <a:p>
+            <a:endParaRPr lang="en-US" sz="1588" dirty="0"/>
+          </a:p>
+          <a:p>
+            <a:r>
+              <a:rPr lang="en-US" sz="1588" b="1" dirty="0" err="1"/>
+              <a:t>HER_mature_catch</a:t>
+            </a:r>
+            <a:r>
+              <a:rPr lang="en-US" sz="1588" b="1" dirty="0"/>
+              <a:t> </a:t>
+            </a:r>
+            <a:r>
+              <a:rPr lang="en-US" sz="1588" dirty="0"/>
+              <a:t>= NEW EXPLORATORY MODEL that estimates selectivity from mature not total population. Assumes catch comps come from mature population (catch = 100% mature)</a:t>
+            </a:r>
           </a:p>
         </p:txBody>
       </p:sp>
@@ -3683,7 +3755,7 @@
             </a:r>
             <a:r>
               <a:rPr lang="en-US" sz="1588" dirty="0"/>
-              <a:t>– documentation for the statistical catch-at-age model</a:t>
+              <a:t>– documentation for project-level organization and model details</a:t>
             </a:r>
           </a:p>
           <a:p>
@@ -4171,7 +4243,7 @@
             </a:r>
             <a:r>
               <a:rPr lang="en-US" sz="1588" dirty="0"/>
-              <a:t>– currently only includes LS model results for comparison with HER. </a:t>
+              <a:t>– currently only includes LS model results for comparison with HER and historical data tables</a:t>
             </a:r>
           </a:p>
           <a:p>
@@ -4539,8 +4611,8 @@
         </p:nvSpPr>
         <p:spPr>
           <a:xfrm>
-            <a:off x="2174750" y="247764"/>
-            <a:ext cx="3861378" cy="825419"/>
+            <a:off x="624245" y="202628"/>
+            <a:ext cx="2268570" cy="1069780"/>
           </a:xfrm>
           <a:prstGeom prst="rect">
             <a:avLst/>
@@ -4555,7 +4627,13 @@
           <a:p>
             <a:r>
               <a:rPr lang="en-US" sz="1588" dirty="0"/>
-              <a:t>Folder directory (part 3):  2019 results folder</a:t>
+              <a:t>Folder directory (part 3): </a:t>
+            </a:r>
+          </a:p>
+          <a:p>
+            <a:r>
+              <a:rPr lang="en-US" sz="1588" dirty="0"/>
+              <a:t> 2019 R scripts</a:t>
             </a:r>
           </a:p>
           <a:p>
@@ -4584,8 +4662,8 @@
         </p:nvSpPr>
         <p:spPr>
           <a:xfrm>
-            <a:off x="2965208" y="1865351"/>
-            <a:ext cx="6867154" cy="1069780"/>
+            <a:off x="1481701" y="1969987"/>
+            <a:ext cx="6867154" cy="825419"/>
           </a:xfrm>
           <a:prstGeom prst="rect">
             <a:avLst/>
@@ -4600,11 +4678,11 @@
           <a:p>
             <a:r>
               <a:rPr lang="en-US" sz="1588" b="1" dirty="0"/>
-              <a:t>results </a:t>
+              <a:t>r </a:t>
             </a:r>
             <a:r>
               <a:rPr lang="en-US" sz="1588" dirty="0"/>
-              <a:t>– figures, csv output, and archive of all models run in model selection, retrospective, and sensitivity analyses</a:t>
+              <a:t>– all R code</a:t>
             </a:r>
           </a:p>
           <a:p>
@@ -4629,8 +4707,8 @@
         </p:nvSpPr>
         <p:spPr>
           <a:xfrm>
-            <a:off x="3461826" y="2550426"/>
-            <a:ext cx="6242048" cy="4030847"/>
+            <a:off x="3414538" y="372811"/>
+            <a:ext cx="8030442" cy="6421181"/>
           </a:xfrm>
           <a:prstGeom prst="rect">
             <a:avLst/>
@@ -4644,49 +4722,85 @@
           <a:lstStyle/>
           <a:p>
             <a:r>
+              <a:rPr lang="en-US" sz="1412" b="1" dirty="0" err="1"/>
+              <a:t>helper.R</a:t>
+            </a:r>
+            <a:r>
+              <a:rPr lang="en-US" sz="1412" dirty="0"/>
+              <a:t>– libraries, ggplot2 themes, and user-defined functions (sourced by all other script files) </a:t>
+            </a:r>
+          </a:p>
+          <a:p>
+            <a:endParaRPr lang="en-US" sz="1412" b="1" dirty="0"/>
+          </a:p>
+          <a:p>
+            <a:r>
+              <a:rPr lang="en-US" sz="1412" b="1" dirty="0" err="1"/>
+              <a:t>her.R</a:t>
+            </a:r>
+            <a:r>
               <a:rPr lang="en-US" sz="1412" b="1" dirty="0"/>
-              <a:t>HER_bestLS_321 – </a:t>
+              <a:t>– </a:t>
             </a:r>
             <a:r>
               <a:rPr lang="en-US" sz="1412" dirty="0"/>
-              <a:t>includes comparison figures of this model’s results with LS best, HER-specific figures, diagnostics for the Bayesian analysis, and csv files of all the posterior sample summaries</a:t>
-            </a:r>
-          </a:p>
-          <a:p>
+              <a:t>Run any version/</a:t>
+            </a:r>
+            <a:r>
+              <a:rPr lang="en-US" sz="1412" dirty="0" err="1"/>
+              <a:t>tpl</a:t>
+            </a:r>
+            <a:r>
+              <a:rPr lang="en-US" sz="1412" dirty="0"/>
+              <a:t> of HER (MLE or Bayesian) and compare with LS. Saves output to </a:t>
+            </a:r>
+            <a:r>
+              <a:rPr lang="en-US" sz="1412" dirty="0" err="1"/>
+              <a:t>sudirectory</a:t>
+            </a:r>
+            <a:r>
+              <a:rPr lang="en-US" sz="1412" dirty="0"/>
+              <a:t> in results/ named after the HER version/</a:t>
+            </a:r>
+            <a:r>
+              <a:rPr lang="en-US" sz="1412" dirty="0" err="1"/>
+              <a:t>tpl</a:t>
+            </a:r>
             <a:endParaRPr lang="en-US" sz="1412" dirty="0"/>
           </a:p>
           <a:p>
-            <a:r>
-              <a:rPr lang="en-US" sz="1412" b="1" dirty="0"/>
-              <a:t>HER_best_condCatch.12_322 </a:t>
+            <a:endParaRPr lang="en-US" sz="1412" dirty="0"/>
+          </a:p>
+          <a:p>
+            <a:r>
+              <a:rPr lang="en-US" sz="1412" b="1" dirty="0" err="1"/>
+              <a:t>model_selection.R</a:t>
             </a:r>
             <a:r>
               <a:rPr lang="en-US" sz="1412" dirty="0"/>
-              <a:t>– same as above</a:t>
-            </a:r>
-            <a:br>
+              <a:t>– recreates model selection “loop code”. Examines all permutations of time-varying parameters given user-defined time blocks. Saves output to subdirectory of results/</a:t>
+            </a:r>
+            <a:r>
+              <a:rPr lang="en-US" sz="1412" dirty="0" err="1"/>
+              <a:t>model_selection</a:t>
+            </a:r>
+            <a:r>
               <a:rPr lang="en-US" sz="1412" dirty="0"/>
-            </a:br>
+              <a:t>/ named after the HER version/</a:t>
+            </a:r>
+            <a:r>
+              <a:rPr lang="en-US" sz="1412" dirty="0" err="1"/>
+              <a:t>tpl</a:t>
+            </a:r>
             <a:endParaRPr lang="en-US" sz="1412" dirty="0"/>
           </a:p>
           <a:p>
-            <a:r>
-              <a:rPr lang="en-US" sz="1412" b="1" dirty="0"/>
-              <a:t>HER_best_condEffort.12_322 </a:t>
-            </a:r>
-            <a:r>
-              <a:rPr lang="en-US" sz="1412" dirty="0"/>
-              <a:t>– same as above</a:t>
-            </a:r>
-            <a:br>
-              <a:rPr lang="en-US" sz="1412" dirty="0"/>
-            </a:br>
             <a:endParaRPr lang="en-US" sz="1412" dirty="0"/>
           </a:p>
           <a:p>
             <a:r>
               <a:rPr lang="en-US" sz="1412" b="1" dirty="0" err="1"/>
-              <a:t>model_selection</a:t>
+              <a:t>model_selection_natmat.R</a:t>
             </a:r>
             <a:r>
               <a:rPr lang="en-US" sz="1412" b="1" dirty="0"/>
@@ -4694,7 +4808,31 @@
             </a:r>
             <a:r>
               <a:rPr lang="en-US" sz="1412" dirty="0"/>
-              <a:t>– includes model selection results for HER conditioned on catch and effort</a:t>
+              <a:t>– same as </a:t>
+            </a:r>
+            <a:r>
+              <a:rPr lang="en-US" sz="1412" dirty="0" err="1"/>
+              <a:t>model_selection.R</a:t>
+            </a:r>
+            <a:r>
+              <a:rPr lang="en-US" sz="1412" dirty="0"/>
+              <a:t>, except only examines survival/natural mortality. Also saves output to subdirectory of results/</a:t>
+            </a:r>
+            <a:r>
+              <a:rPr lang="en-US" sz="1412" dirty="0" err="1"/>
+              <a:t>model_selection</a:t>
+            </a:r>
+            <a:r>
+              <a:rPr lang="en-US" sz="1412" dirty="0"/>
+              <a:t>/ named after the HER version/</a:t>
+            </a:r>
+            <a:r>
+              <a:rPr lang="en-US" sz="1412" dirty="0" err="1"/>
+              <a:t>tpl</a:t>
+            </a:r>
+            <a:r>
+              <a:rPr lang="en-US" sz="1412" dirty="0"/>
+              <a:t>. </a:t>
             </a:r>
           </a:p>
           <a:p>
@@ -4702,21 +4840,8 @@
           </a:p>
           <a:p>
             <a:r>
-              <a:rPr lang="en-US" sz="1412" b="1" dirty="0"/>
-              <a:t>retrospective </a:t>
-            </a:r>
-            <a:r>
-              <a:rPr lang="en-US" sz="1412" dirty="0"/>
-              <a:t>– results for the retrospective analysis for HER_bestLS_321, HER_best_condCatch.12_322, and HER_best_condCatch.12_322</a:t>
-            </a:r>
-          </a:p>
-          <a:p>
-            <a:endParaRPr lang="en-US" sz="1412" dirty="0"/>
-          </a:p>
-          <a:p>
-            <a:r>
               <a:rPr lang="en-US" sz="1412" b="1" dirty="0" err="1"/>
-              <a:t>sensitivity_sigmaM</a:t>
+              <a:t>retrospective.R</a:t>
             </a:r>
             <a:r>
               <a:rPr lang="en-US" sz="1412" b="1" dirty="0"/>
@@ -4724,7 +4849,66 @@
             </a:r>
             <a:r>
               <a:rPr lang="en-US" sz="1412" dirty="0"/>
-              <a:t>– results for sensitivity analysis examining convergence diagnostics and model output for </a:t>
+              <a:t>– run retrospective analysis (peel years of data from assessment to compare current results with past results assuming the same model structure. Results in retrospective/ for given HER </a:t>
+            </a:r>
+            <a:r>
+              <a:rPr lang="en-US" sz="1412" dirty="0" err="1"/>
+              <a:t>tpl</a:t>
+            </a:r>
+            <a:r>
+              <a:rPr lang="en-US" sz="1412" dirty="0"/>
+              <a:t> versions.</a:t>
+            </a:r>
+          </a:p>
+          <a:p>
+            <a:endParaRPr lang="en-US" sz="1412" dirty="0"/>
+          </a:p>
+          <a:p>
+            <a:r>
+              <a:rPr lang="en-US" sz="1412" b="1" dirty="0" err="1"/>
+              <a:t>pdo_breaks.R</a:t>
+            </a:r>
+            <a:r>
+              <a:rPr lang="en-US" sz="1412" b="1" dirty="0"/>
+              <a:t> </a:t>
+            </a:r>
+            <a:r>
+              <a:rPr lang="en-US" sz="1412" dirty="0"/>
+              <a:t>– get PDO breaks using STARS algorithm, which is sourced in </a:t>
+            </a:r>
+            <a:r>
+              <a:rPr lang="en-US" sz="1412" b="1" dirty="0" err="1"/>
+              <a:t>stars.R</a:t>
+            </a:r>
+            <a:r>
+              <a:rPr lang="en-US" sz="1412" b="1" dirty="0"/>
+              <a:t>. </a:t>
+            </a:r>
+            <a:r>
+              <a:rPr lang="en-US" sz="1412" dirty="0"/>
+              <a:t>Results stored in results/</a:t>
+            </a:r>
+            <a:r>
+              <a:rPr lang="en-US" sz="1412" dirty="0" err="1"/>
+              <a:t>stars_pdo</a:t>
+            </a:r>
+            <a:endParaRPr lang="en-US" sz="1412" b="1" dirty="0"/>
+          </a:p>
+          <a:p>
+            <a:endParaRPr lang="en-US" sz="1412" dirty="0"/>
+          </a:p>
+          <a:p>
+            <a:r>
+              <a:rPr lang="en-US" sz="1412" b="1" dirty="0" err="1"/>
+              <a:t>sensitivity_sigmaM.R</a:t>
+            </a:r>
+            <a:r>
+              <a:rPr lang="en-US" sz="1412" b="1" dirty="0"/>
+              <a:t> </a:t>
+            </a:r>
+            <a:r>
+              <a:rPr lang="en-US" sz="1412" dirty="0"/>
+              <a:t>– sensitivity analysis for </a:t>
             </a:r>
             <a:r>
               <a:rPr lang="en-US" sz="1412" dirty="0" err="1"/>
@@ -4732,7 +4916,23 @@
             </a:r>
             <a:r>
               <a:rPr lang="en-US" sz="1412" dirty="0"/>
-              <a:t> from 0.05-0.10. </a:t>
+              <a:t>, parameter controlling variability in natural mortality deviations by block. Uses </a:t>
+            </a:r>
+            <a:r>
+              <a:rPr lang="en-US" sz="1412" b="1" dirty="0" err="1"/>
+              <a:t>create_ctl.R</a:t>
+            </a:r>
+            <a:r>
+              <a:rPr lang="en-US" sz="1412" dirty="0"/>
+              <a:t>. Results in results/</a:t>
+            </a:r>
+            <a:r>
+              <a:rPr lang="en-US" sz="1412" dirty="0" err="1"/>
+              <a:t>sensitivity_sigmaM</a:t>
+            </a:r>
+            <a:r>
+              <a:rPr lang="en-US" sz="1412" dirty="0"/>
+              <a:t>. </a:t>
             </a:r>
             <a:r>
               <a:rPr lang="en-US" sz="1412" dirty="0" err="1"/>
@@ -4740,8 +4940,49 @@
             </a:r>
             <a:r>
               <a:rPr lang="en-US" sz="1412" dirty="0"/>
-              <a:t> = 0.09 had best convergence diagnostics</a:t>
-            </a:r>
+              <a:t> = 0.09 had best convergence diagnostics. </a:t>
+            </a:r>
+          </a:p>
+          <a:p>
+            <a:endParaRPr lang="en-US" sz="1412" dirty="0"/>
+          </a:p>
+          <a:p>
+            <a:r>
+              <a:rPr lang="en-US" sz="1412" b="1" dirty="0" err="1"/>
+              <a:t>sensitivity_maturity.R</a:t>
+            </a:r>
+            <a:r>
+              <a:rPr lang="en-US" sz="1412" b="1" dirty="0"/>
+              <a:t> </a:t>
+            </a:r>
+            <a:r>
+              <a:rPr lang="en-US" sz="1412" dirty="0"/>
+              <a:t>– compare a range of fixed to estimated maturities. Results in results/</a:t>
+            </a:r>
+            <a:r>
+              <a:rPr lang="en-US" sz="1412" dirty="0" err="1"/>
+              <a:t>sensitivity_maturity</a:t>
+            </a:r>
+            <a:endParaRPr lang="en-US" sz="1412" dirty="0"/>
+          </a:p>
+          <a:p>
+            <a:endParaRPr lang="en-US" sz="1412" dirty="0"/>
+          </a:p>
+          <a:p>
+            <a:r>
+              <a:rPr lang="en-US" sz="1412" b="1" dirty="0" err="1"/>
+              <a:t>presentation_figs.R</a:t>
+            </a:r>
+            <a:r>
+              <a:rPr lang="en-US" sz="1412" b="1" dirty="0"/>
+              <a:t> </a:t>
+            </a:r>
+            <a:r>
+              <a:rPr lang="en-US" sz="1412" dirty="0"/>
+              <a:t>– creates presentation-quality figs in presentation/ subdirectory of results/ under various model versions</a:t>
+            </a:r>
+          </a:p>
+          <a:p>
             <a:endParaRPr lang="en-US" sz="1412" b="1" dirty="0"/>
           </a:p>
           <a:p>
@@ -4749,97 +4990,21 @@
           </a:p>
         </p:txBody>
       </p:sp>
-      <p:cxnSp>
-        <p:nvCxnSpPr>
-          <p:cNvPr id="7" name="Straight Connector 6">
-            <a:extLst>
-              <a:ext uri="{FF2B5EF4-FFF2-40B4-BE49-F238E27FC236}">
-                <a16:creationId xmlns:a16="http://schemas.microsoft.com/office/drawing/2014/main" id="{CDB52091-97D0-40F3-AB87-570F71E26A03}"/>
-              </a:ext>
-            </a:extLst>
-          </p:cNvPr>
-          <p:cNvCxnSpPr>
-            <a:cxnSpLocks/>
-          </p:cNvCxnSpPr>
+      <p:sp>
+        <p:nvSpPr>
+          <p:cNvPr id="11" name="TextBox 10">
+            <a:extLst>
+              <a:ext uri="{FF2B5EF4-FFF2-40B4-BE49-F238E27FC236}">
+                <a16:creationId xmlns:a16="http://schemas.microsoft.com/office/drawing/2014/main" id="{89BF299B-FC78-41B8-A7E7-BD6D5DF43D56}"/>
+              </a:ext>
+            </a:extLst>
+          </p:cNvPr>
+          <p:cNvSpPr txBox="1"/>
           <p:nvPr/>
-        </p:nvCxnSpPr>
+        </p:nvSpPr>
         <p:spPr>
           <a:xfrm>
-            <a:off x="2724630" y="1616900"/>
-            <a:ext cx="0" cy="431733"/>
-          </a:xfrm>
-          <a:prstGeom prst="line">
-            <a:avLst/>
-          </a:prstGeom>
-        </p:spPr>
-        <p:style>
-          <a:lnRef idx="1">
-            <a:schemeClr val="dk1"/>
-          </a:lnRef>
-          <a:fillRef idx="0">
-            <a:schemeClr val="dk1"/>
-          </a:fillRef>
-          <a:effectRef idx="0">
-            <a:schemeClr val="dk1"/>
-          </a:effectRef>
-          <a:fontRef idx="minor">
-            <a:schemeClr val="tx1"/>
-          </a:fontRef>
-        </p:style>
-      </p:cxnSp>
-      <p:cxnSp>
-        <p:nvCxnSpPr>
-          <p:cNvPr id="8" name="Straight Connector 7">
-            <a:extLst>
-              <a:ext uri="{FF2B5EF4-FFF2-40B4-BE49-F238E27FC236}">
-                <a16:creationId xmlns:a16="http://schemas.microsoft.com/office/drawing/2014/main" id="{43A4DD42-7602-47B7-A6D2-8C9A5C0B59C4}"/>
-              </a:ext>
-            </a:extLst>
-          </p:cNvPr>
-          <p:cNvCxnSpPr>
-            <a:cxnSpLocks/>
-          </p:cNvCxnSpPr>
-          <p:nvPr/>
-        </p:nvCxnSpPr>
-        <p:spPr>
-          <a:xfrm>
-            <a:off x="2724630" y="2049126"/>
-            <a:ext cx="268941" cy="0"/>
-          </a:xfrm>
-          <a:prstGeom prst="line">
-            <a:avLst/>
-          </a:prstGeom>
-        </p:spPr>
-        <p:style>
-          <a:lnRef idx="1">
-            <a:schemeClr val="dk1"/>
-          </a:lnRef>
-          <a:fillRef idx="0">
-            <a:schemeClr val="dk1"/>
-          </a:fillRef>
-          <a:effectRef idx="0">
-            <a:schemeClr val="dk1"/>
-          </a:effectRef>
-          <a:fontRef idx="minor">
-            <a:schemeClr val="tx1"/>
-          </a:fontRef>
-        </p:style>
-      </p:cxnSp>
-      <p:sp>
-        <p:nvSpPr>
-          <p:cNvPr id="11" name="TextBox 10">
-            <a:extLst>
-              <a:ext uri="{FF2B5EF4-FFF2-40B4-BE49-F238E27FC236}">
-                <a16:creationId xmlns:a16="http://schemas.microsoft.com/office/drawing/2014/main" id="{89BF299B-FC78-41B8-A7E7-BD6D5DF43D56}"/>
-              </a:ext>
-            </a:extLst>
-          </p:cNvPr>
-          <p:cNvSpPr txBox="1"/>
-          <p:nvPr/>
-        </p:nvSpPr>
-        <p:spPr>
-          <a:xfrm>
-            <a:off x="2578161" y="1046608"/>
+            <a:off x="1162647" y="1272408"/>
             <a:ext cx="1373196" cy="581057"/>
           </a:xfrm>
           <a:prstGeom prst="rect">
@@ -4863,82 +5028,6 @@
           </a:p>
         </p:txBody>
       </p:sp>
-      <p:cxnSp>
-        <p:nvCxnSpPr>
-          <p:cNvPr id="12" name="Straight Connector 11">
-            <a:extLst>
-              <a:ext uri="{FF2B5EF4-FFF2-40B4-BE49-F238E27FC236}">
-                <a16:creationId xmlns:a16="http://schemas.microsoft.com/office/drawing/2014/main" id="{D6D7B278-FF0C-4C13-8BE0-385D148F6BF3}"/>
-              </a:ext>
-            </a:extLst>
-          </p:cNvPr>
-          <p:cNvCxnSpPr>
-            <a:cxnSpLocks/>
-          </p:cNvCxnSpPr>
-          <p:nvPr/>
-        </p:nvCxnSpPr>
-        <p:spPr>
-          <a:xfrm>
-            <a:off x="2309220" y="1111197"/>
-            <a:ext cx="0" cy="431733"/>
-          </a:xfrm>
-          <a:prstGeom prst="line">
-            <a:avLst/>
-          </a:prstGeom>
-        </p:spPr>
-        <p:style>
-          <a:lnRef idx="1">
-            <a:schemeClr val="dk1"/>
-          </a:lnRef>
-          <a:fillRef idx="0">
-            <a:schemeClr val="dk1"/>
-          </a:fillRef>
-          <a:effectRef idx="0">
-            <a:schemeClr val="dk1"/>
-          </a:effectRef>
-          <a:fontRef idx="minor">
-            <a:schemeClr val="tx1"/>
-          </a:fontRef>
-        </p:style>
-      </p:cxnSp>
-      <p:cxnSp>
-        <p:nvCxnSpPr>
-          <p:cNvPr id="13" name="Straight Connector 12">
-            <a:extLst>
-              <a:ext uri="{FF2B5EF4-FFF2-40B4-BE49-F238E27FC236}">
-                <a16:creationId xmlns:a16="http://schemas.microsoft.com/office/drawing/2014/main" id="{587BFBAF-6177-41CD-8D07-042BF4F951B8}"/>
-              </a:ext>
-            </a:extLst>
-          </p:cNvPr>
-          <p:cNvCxnSpPr>
-            <a:cxnSpLocks/>
-          </p:cNvCxnSpPr>
-          <p:nvPr/>
-        </p:nvCxnSpPr>
-        <p:spPr>
-          <a:xfrm>
-            <a:off x="2309220" y="1542929"/>
-            <a:ext cx="268941" cy="0"/>
-          </a:xfrm>
-          <a:prstGeom prst="line">
-            <a:avLst/>
-          </a:prstGeom>
-        </p:spPr>
-        <p:style>
-          <a:lnRef idx="1">
-            <a:schemeClr val="dk1"/>
-          </a:lnRef>
-          <a:fillRef idx="0">
-            <a:schemeClr val="dk1"/>
-          </a:fillRef>
-          <a:effectRef idx="0">
-            <a:schemeClr val="dk1"/>
-          </a:effectRef>
-          <a:fontRef idx="minor">
-            <a:schemeClr val="tx1"/>
-          </a:fontRef>
-        </p:style>
-      </p:cxnSp>
       <p:grpSp>
         <p:nvGrpSpPr>
           <p:cNvPr id="14" name="Group 13">
@@ -4953,10 +5042,10 @@
         </p:nvGrpSpPr>
         <p:grpSpPr>
           <a:xfrm>
-            <a:off x="3085435" y="2394908"/>
-            <a:ext cx="275374" cy="3338160"/>
-            <a:chOff x="1012371" y="1806099"/>
-            <a:chExt cx="312091" cy="3783248"/>
+            <a:off x="2881742" y="862492"/>
+            <a:ext cx="275374" cy="3040407"/>
+            <a:chOff x="1012371" y="2143552"/>
+            <a:chExt cx="312091" cy="3445795"/>
           </a:xfrm>
         </p:grpSpPr>
         <p:cxnSp>
@@ -4975,8 +5064,8 @@
           </p:nvCxnSpPr>
           <p:spPr>
             <a:xfrm>
-              <a:off x="1012371" y="1806099"/>
-              <a:ext cx="0" cy="3783248"/>
+              <a:off x="1012371" y="2143552"/>
+              <a:ext cx="0" cy="3445795"/>
             </a:xfrm>
             <a:prstGeom prst="line">
               <a:avLst/>
@@ -5051,7 +5140,7 @@
           </p:nvCxnSpPr>
           <p:spPr>
             <a:xfrm>
-              <a:off x="1012371" y="3134156"/>
+              <a:off x="1012371" y="2863807"/>
               <a:ext cx="304800" cy="0"/>
             </a:xfrm>
             <a:prstGeom prst="line">
@@ -5150,12 +5239,303 @@
           </p:style>
         </p:cxnSp>
       </p:grpSp>
+      <p:grpSp>
+        <p:nvGrpSpPr>
+          <p:cNvPr id="28" name="Group 27">
+            <a:extLst>
+              <a:ext uri="{FF2B5EF4-FFF2-40B4-BE49-F238E27FC236}">
+                <a16:creationId xmlns:a16="http://schemas.microsoft.com/office/drawing/2014/main" id="{A7B6C621-FD13-4A57-B54F-D1D158430FEE}"/>
+              </a:ext>
+            </a:extLst>
+          </p:cNvPr>
+          <p:cNvGrpSpPr/>
+          <p:nvPr/>
+        </p:nvGrpSpPr>
+        <p:grpSpPr>
+          <a:xfrm>
+            <a:off x="2493868" y="2343090"/>
+            <a:ext cx="398947" cy="452316"/>
+            <a:chOff x="2986416" y="2343090"/>
+            <a:chExt cx="398947" cy="452316"/>
+          </a:xfrm>
+        </p:grpSpPr>
+        <p:cxnSp>
+          <p:nvCxnSpPr>
+            <p:cNvPr id="21" name="Straight Connector 20">
+              <a:extLst>
+                <a:ext uri="{FF2B5EF4-FFF2-40B4-BE49-F238E27FC236}">
+                  <a16:creationId xmlns:a16="http://schemas.microsoft.com/office/drawing/2014/main" id="{9F479048-39FC-4FE6-A687-8E8351E09B52}"/>
+                </a:ext>
+              </a:extLst>
+            </p:cNvPr>
+            <p:cNvCxnSpPr>
+              <a:cxnSpLocks/>
+            </p:cNvCxnSpPr>
+            <p:nvPr/>
+          </p:nvCxnSpPr>
+          <p:spPr>
+            <a:xfrm>
+              <a:off x="2986416" y="2795406"/>
+              <a:ext cx="398947" cy="0"/>
+            </a:xfrm>
+            <a:prstGeom prst="line">
+              <a:avLst/>
+            </a:prstGeom>
+          </p:spPr>
+          <p:style>
+            <a:lnRef idx="1">
+              <a:schemeClr val="dk1"/>
+            </a:lnRef>
+            <a:fillRef idx="0">
+              <a:schemeClr val="dk1"/>
+            </a:fillRef>
+            <a:effectRef idx="0">
+              <a:schemeClr val="dk1"/>
+            </a:effectRef>
+            <a:fontRef idx="minor">
+              <a:schemeClr val="tx1"/>
+            </a:fontRef>
+          </p:style>
+        </p:cxnSp>
+        <p:cxnSp>
+          <p:nvCxnSpPr>
+            <p:cNvPr id="27" name="Straight Connector 26">
+              <a:extLst>
+                <a:ext uri="{FF2B5EF4-FFF2-40B4-BE49-F238E27FC236}">
+                  <a16:creationId xmlns:a16="http://schemas.microsoft.com/office/drawing/2014/main" id="{705FC3D4-E41B-4318-B76A-8D434B30BB37}"/>
+                </a:ext>
+              </a:extLst>
+            </p:cNvPr>
+            <p:cNvCxnSpPr>
+              <a:cxnSpLocks/>
+            </p:cNvCxnSpPr>
+            <p:nvPr/>
+          </p:nvCxnSpPr>
+          <p:spPr>
+            <a:xfrm>
+              <a:off x="2986416" y="2343090"/>
+              <a:ext cx="0" cy="452316"/>
+            </a:xfrm>
+            <a:prstGeom prst="line">
+              <a:avLst/>
+            </a:prstGeom>
+          </p:spPr>
+          <p:style>
+            <a:lnRef idx="1">
+              <a:schemeClr val="dk1"/>
+            </a:lnRef>
+            <a:fillRef idx="0">
+              <a:schemeClr val="dk1"/>
+            </a:fillRef>
+            <a:effectRef idx="0">
+              <a:schemeClr val="dk1"/>
+            </a:effectRef>
+            <a:fontRef idx="minor">
+              <a:schemeClr val="tx1"/>
+            </a:fontRef>
+          </p:style>
+        </p:cxnSp>
+      </p:grpSp>
+      <p:grpSp>
+        <p:nvGrpSpPr>
+          <p:cNvPr id="29" name="Group 28">
+            <a:extLst>
+              <a:ext uri="{FF2B5EF4-FFF2-40B4-BE49-F238E27FC236}">
+                <a16:creationId xmlns:a16="http://schemas.microsoft.com/office/drawing/2014/main" id="{5A25827C-8141-4D0C-A67A-EBCBC5707CC4}"/>
+              </a:ext>
+            </a:extLst>
+          </p:cNvPr>
+          <p:cNvGrpSpPr/>
+          <p:nvPr/>
+        </p:nvGrpSpPr>
+        <p:grpSpPr>
+          <a:xfrm>
+            <a:off x="1025316" y="1716005"/>
+            <a:ext cx="398947" cy="452316"/>
+            <a:chOff x="2986416" y="2343090"/>
+            <a:chExt cx="398947" cy="452316"/>
+          </a:xfrm>
+        </p:grpSpPr>
+        <p:cxnSp>
+          <p:nvCxnSpPr>
+            <p:cNvPr id="30" name="Straight Connector 29">
+              <a:extLst>
+                <a:ext uri="{FF2B5EF4-FFF2-40B4-BE49-F238E27FC236}">
+                  <a16:creationId xmlns:a16="http://schemas.microsoft.com/office/drawing/2014/main" id="{410FD69B-DC54-49A5-851A-4D192C2F67A1}"/>
+                </a:ext>
+              </a:extLst>
+            </p:cNvPr>
+            <p:cNvCxnSpPr>
+              <a:cxnSpLocks/>
+            </p:cNvCxnSpPr>
+            <p:nvPr/>
+          </p:nvCxnSpPr>
+          <p:spPr>
+            <a:xfrm>
+              <a:off x="2986416" y="2795406"/>
+              <a:ext cx="398947" cy="0"/>
+            </a:xfrm>
+            <a:prstGeom prst="line">
+              <a:avLst/>
+            </a:prstGeom>
+          </p:spPr>
+          <p:style>
+            <a:lnRef idx="1">
+              <a:schemeClr val="dk1"/>
+            </a:lnRef>
+            <a:fillRef idx="0">
+              <a:schemeClr val="dk1"/>
+            </a:fillRef>
+            <a:effectRef idx="0">
+              <a:schemeClr val="dk1"/>
+            </a:effectRef>
+            <a:fontRef idx="minor">
+              <a:schemeClr val="tx1"/>
+            </a:fontRef>
+          </p:style>
+        </p:cxnSp>
+        <p:cxnSp>
+          <p:nvCxnSpPr>
+            <p:cNvPr id="31" name="Straight Connector 30">
+              <a:extLst>
+                <a:ext uri="{FF2B5EF4-FFF2-40B4-BE49-F238E27FC236}">
+                  <a16:creationId xmlns:a16="http://schemas.microsoft.com/office/drawing/2014/main" id="{BDACEC9F-7747-4686-BD43-02DD10FD85A0}"/>
+                </a:ext>
+              </a:extLst>
+            </p:cNvPr>
+            <p:cNvCxnSpPr>
+              <a:cxnSpLocks/>
+            </p:cNvCxnSpPr>
+            <p:nvPr/>
+          </p:nvCxnSpPr>
+          <p:spPr>
+            <a:xfrm>
+              <a:off x="2986416" y="2343090"/>
+              <a:ext cx="0" cy="452316"/>
+            </a:xfrm>
+            <a:prstGeom prst="line">
+              <a:avLst/>
+            </a:prstGeom>
+          </p:spPr>
+          <p:style>
+            <a:lnRef idx="1">
+              <a:schemeClr val="dk1"/>
+            </a:lnRef>
+            <a:fillRef idx="0">
+              <a:schemeClr val="dk1"/>
+            </a:fillRef>
+            <a:effectRef idx="0">
+              <a:schemeClr val="dk1"/>
+            </a:effectRef>
+            <a:fontRef idx="minor">
+              <a:schemeClr val="tx1"/>
+            </a:fontRef>
+          </p:style>
+        </p:cxnSp>
+      </p:grpSp>
+      <p:grpSp>
+        <p:nvGrpSpPr>
+          <p:cNvPr id="32" name="Group 31">
+            <a:extLst>
+              <a:ext uri="{FF2B5EF4-FFF2-40B4-BE49-F238E27FC236}">
+                <a16:creationId xmlns:a16="http://schemas.microsoft.com/office/drawing/2014/main" id="{E23113B6-3DA5-4BE6-AA1C-35A815359D28}"/>
+              </a:ext>
+            </a:extLst>
+          </p:cNvPr>
+          <p:cNvGrpSpPr/>
+          <p:nvPr/>
+        </p:nvGrpSpPr>
+        <p:grpSpPr>
+          <a:xfrm>
+            <a:off x="747021" y="1168881"/>
+            <a:ext cx="398947" cy="452316"/>
+            <a:chOff x="2986416" y="2343090"/>
+            <a:chExt cx="398947" cy="452316"/>
+          </a:xfrm>
+        </p:grpSpPr>
+        <p:cxnSp>
+          <p:nvCxnSpPr>
+            <p:cNvPr id="33" name="Straight Connector 32">
+              <a:extLst>
+                <a:ext uri="{FF2B5EF4-FFF2-40B4-BE49-F238E27FC236}">
+                  <a16:creationId xmlns:a16="http://schemas.microsoft.com/office/drawing/2014/main" id="{D1720985-B7F9-486F-B29A-AB788B3A84E0}"/>
+                </a:ext>
+              </a:extLst>
+            </p:cNvPr>
+            <p:cNvCxnSpPr>
+              <a:cxnSpLocks/>
+            </p:cNvCxnSpPr>
+            <p:nvPr/>
+          </p:nvCxnSpPr>
+          <p:spPr>
+            <a:xfrm>
+              <a:off x="2986416" y="2795406"/>
+              <a:ext cx="398947" cy="0"/>
+            </a:xfrm>
+            <a:prstGeom prst="line">
+              <a:avLst/>
+            </a:prstGeom>
+          </p:spPr>
+          <p:style>
+            <a:lnRef idx="1">
+              <a:schemeClr val="dk1"/>
+            </a:lnRef>
+            <a:fillRef idx="0">
+              <a:schemeClr val="dk1"/>
+            </a:fillRef>
+            <a:effectRef idx="0">
+              <a:schemeClr val="dk1"/>
+            </a:effectRef>
+            <a:fontRef idx="minor">
+              <a:schemeClr val="tx1"/>
+            </a:fontRef>
+          </p:style>
+        </p:cxnSp>
+        <p:cxnSp>
+          <p:nvCxnSpPr>
+            <p:cNvPr id="34" name="Straight Connector 33">
+              <a:extLst>
+                <a:ext uri="{FF2B5EF4-FFF2-40B4-BE49-F238E27FC236}">
+                  <a16:creationId xmlns:a16="http://schemas.microsoft.com/office/drawing/2014/main" id="{7FF2B9C5-3A06-4076-AAC5-21AD1B73AB25}"/>
+                </a:ext>
+              </a:extLst>
+            </p:cNvPr>
+            <p:cNvCxnSpPr>
+              <a:cxnSpLocks/>
+            </p:cNvCxnSpPr>
+            <p:nvPr/>
+          </p:nvCxnSpPr>
+          <p:spPr>
+            <a:xfrm>
+              <a:off x="2986416" y="2343090"/>
+              <a:ext cx="0" cy="452316"/>
+            </a:xfrm>
+            <a:prstGeom prst="line">
+              <a:avLst/>
+            </a:prstGeom>
+          </p:spPr>
+          <p:style>
+            <a:lnRef idx="1">
+              <a:schemeClr val="dk1"/>
+            </a:lnRef>
+            <a:fillRef idx="0">
+              <a:schemeClr val="dk1"/>
+            </a:fillRef>
+            <a:effectRef idx="0">
+              <a:schemeClr val="dk1"/>
+            </a:effectRef>
+            <a:fontRef idx="minor">
+              <a:schemeClr val="tx1"/>
+            </a:fontRef>
+          </p:style>
+        </p:cxnSp>
+      </p:grpSp>
       <p:cxnSp>
         <p:nvCxnSpPr>
-          <p:cNvPr id="21" name="Straight Connector 20">
-            <a:extLst>
-              <a:ext uri="{FF2B5EF4-FFF2-40B4-BE49-F238E27FC236}">
-                <a16:creationId xmlns:a16="http://schemas.microsoft.com/office/drawing/2014/main" id="{9F479048-39FC-4FE6-A687-8E8351E09B52}"/>
+          <p:cNvPr id="23" name="Straight Connector 22">
+            <a:extLst>
+              <a:ext uri="{FF2B5EF4-FFF2-40B4-BE49-F238E27FC236}">
+                <a16:creationId xmlns:a16="http://schemas.microsoft.com/office/drawing/2014/main" id="{463D402E-0025-4983-8AEE-EF0D631C48D2}"/>
               </a:ext>
             </a:extLst>
           </p:cNvPr>
@@ -5166,7 +5546,7 @@
         </p:nvCxnSpPr>
         <p:spPr>
           <a:xfrm>
-            <a:off x="3103524" y="4450388"/>
+            <a:off x="2888175" y="3023547"/>
             <a:ext cx="268941" cy="0"/>
           </a:xfrm>
           <a:prstGeom prst="line">
@@ -5188,12 +5568,867 @@
           </a:fontRef>
         </p:style>
       </p:cxnSp>
+    </p:spTree>
+    <p:extLst>
+      <p:ext uri="{BB962C8B-B14F-4D97-AF65-F5344CB8AC3E}">
+        <p14:creationId xmlns:p14="http://schemas.microsoft.com/office/powerpoint/2010/main" val="3748855043"/>
+      </p:ext>
+    </p:extLst>
+  </p:cSld>
+  <p:clrMapOvr>
+    <a:masterClrMapping/>
+  </p:clrMapOvr>
+</p:sld>
+</file>
+
+<file path=ppt/slides/slide6.xml><?xml version="1.0" encoding="utf-8"?>
+<p:sld xmlns:a="http://schemas.openxmlformats.org/drawingml/2006/main" xmlns:r="http://schemas.openxmlformats.org/officeDocument/2006/relationships" xmlns:p="http://schemas.openxmlformats.org/presentationml/2006/main">
+  <p:cSld>
+    <p:spTree>
+      <p:nvGrpSpPr>
+        <p:cNvPr id="1" name=""/>
+        <p:cNvGrpSpPr/>
+        <p:nvPr/>
+      </p:nvGrpSpPr>
+      <p:grpSpPr>
+        <a:xfrm>
+          <a:off x="0" y="0"/>
+          <a:ext cx="0" cy="0"/>
+          <a:chOff x="0" y="0"/>
+          <a:chExt cx="0" cy="0"/>
+        </a:xfrm>
+      </p:grpSpPr>
+      <p:sp>
+        <p:nvSpPr>
+          <p:cNvPr id="4" name="TextBox 3">
+            <a:extLst>
+              <a:ext uri="{FF2B5EF4-FFF2-40B4-BE49-F238E27FC236}">
+                <a16:creationId xmlns:a16="http://schemas.microsoft.com/office/drawing/2014/main" id="{E4419297-D6F3-47B8-B8DF-90EF9C748FEF}"/>
+              </a:ext>
+            </a:extLst>
+          </p:cNvPr>
+          <p:cNvSpPr txBox="1"/>
+          <p:nvPr/>
+        </p:nvSpPr>
+        <p:spPr>
+          <a:xfrm>
+            <a:off x="624245" y="202628"/>
+            <a:ext cx="2268570" cy="1069780"/>
+          </a:xfrm>
+          <a:prstGeom prst="rect">
+            <a:avLst/>
+          </a:prstGeom>
+          <a:noFill/>
+        </p:spPr>
+        <p:txBody>
+          <a:bodyPr wrap="none" rtlCol="0">
+            <a:spAutoFit/>
+          </a:bodyPr>
+          <a:lstStyle/>
+          <a:p>
+            <a:r>
+              <a:rPr lang="en-US" sz="1588" dirty="0"/>
+              <a:t>Folder directory (part 3): </a:t>
+            </a:r>
+          </a:p>
+          <a:p>
+            <a:r>
+              <a:rPr lang="en-US" sz="1588" dirty="0"/>
+              <a:t> 2019 results folder</a:t>
+            </a:r>
+          </a:p>
+          <a:p>
+            <a:endParaRPr lang="en-US" sz="1588" dirty="0"/>
+          </a:p>
+          <a:p>
+            <a:r>
+              <a:rPr lang="en-US" sz="1588" b="1" dirty="0" err="1"/>
+              <a:t>AlaskaHerring</a:t>
+            </a:r>
+            <a:endParaRPr lang="en-US" sz="1588" b="1" dirty="0"/>
+          </a:p>
+        </p:txBody>
+      </p:sp>
+      <p:sp>
+        <p:nvSpPr>
+          <p:cNvPr id="5" name="TextBox 4">
+            <a:extLst>
+              <a:ext uri="{FF2B5EF4-FFF2-40B4-BE49-F238E27FC236}">
+                <a16:creationId xmlns:a16="http://schemas.microsoft.com/office/drawing/2014/main" id="{60B06435-5C9B-4D82-B347-34369DDC8C5F}"/>
+              </a:ext>
+            </a:extLst>
+          </p:cNvPr>
+          <p:cNvSpPr txBox="1"/>
+          <p:nvPr/>
+        </p:nvSpPr>
+        <p:spPr>
+          <a:xfrm>
+            <a:off x="1481701" y="1969987"/>
+            <a:ext cx="1373196" cy="3024674"/>
+          </a:xfrm>
+          <a:prstGeom prst="rect">
+            <a:avLst/>
+          </a:prstGeom>
+          <a:noFill/>
+        </p:spPr>
+        <p:txBody>
+          <a:bodyPr wrap="square" rtlCol="0">
+            <a:spAutoFit/>
+          </a:bodyPr>
+          <a:lstStyle/>
+          <a:p>
+            <a:r>
+              <a:rPr lang="en-US" sz="1588" b="1" dirty="0"/>
+              <a:t>results </a:t>
+            </a:r>
+            <a:r>
+              <a:rPr lang="en-US" sz="1588" dirty="0"/>
+              <a:t>– figures, csv output, and archive of all models run in model selection, retrospective, and sensitivity analyses</a:t>
+            </a:r>
+          </a:p>
+          <a:p>
+            <a:endParaRPr lang="en-US" sz="1588" dirty="0"/>
+          </a:p>
+          <a:p>
+            <a:endParaRPr lang="en-US" sz="1588" dirty="0"/>
+          </a:p>
+        </p:txBody>
+      </p:sp>
+      <p:sp>
+        <p:nvSpPr>
+          <p:cNvPr id="6" name="TextBox 5">
+            <a:extLst>
+              <a:ext uri="{FF2B5EF4-FFF2-40B4-BE49-F238E27FC236}">
+                <a16:creationId xmlns:a16="http://schemas.microsoft.com/office/drawing/2014/main" id="{74B61F36-28A1-4FD3-BBDD-D43533D32EBD}"/>
+              </a:ext>
+            </a:extLst>
+          </p:cNvPr>
+          <p:cNvSpPr txBox="1"/>
+          <p:nvPr/>
+        </p:nvSpPr>
+        <p:spPr>
+          <a:xfrm>
+            <a:off x="3414538" y="372811"/>
+            <a:ext cx="8030442" cy="5334666"/>
+          </a:xfrm>
+          <a:prstGeom prst="rect">
+            <a:avLst/>
+          </a:prstGeom>
+          <a:noFill/>
+        </p:spPr>
+        <p:txBody>
+          <a:bodyPr wrap="square" rtlCol="0">
+            <a:spAutoFit/>
+          </a:bodyPr>
+          <a:lstStyle/>
+          <a:p>
+            <a:r>
+              <a:rPr lang="en-US" sz="1412" b="1" dirty="0"/>
+              <a:t>HER_bestLS_321 – </a:t>
+            </a:r>
+            <a:r>
+              <a:rPr lang="en-US" sz="1412" dirty="0"/>
+              <a:t>includes comparison figures of this model’s results with LS best, HER-specific figures, diagnostics for the Bayesian analysis, and csv files of all the posterior sample summaries</a:t>
+            </a:r>
+          </a:p>
+          <a:p>
+            <a:endParaRPr lang="en-US" sz="1412" dirty="0"/>
+          </a:p>
+          <a:p>
+            <a:r>
+              <a:rPr lang="en-US" sz="1412" b="1" dirty="0"/>
+              <a:t>HER_best_condCatch.12_322 </a:t>
+            </a:r>
+            <a:r>
+              <a:rPr lang="en-US" sz="1412" dirty="0"/>
+              <a:t>– same as above</a:t>
+            </a:r>
+            <a:br>
+              <a:rPr lang="en-US" sz="1412" dirty="0"/>
+            </a:br>
+            <a:endParaRPr lang="en-US" sz="1412" dirty="0"/>
+          </a:p>
+          <a:p>
+            <a:r>
+              <a:rPr lang="en-US" sz="1412" b="1" dirty="0"/>
+              <a:t>HER_best_condEffort.12_322 </a:t>
+            </a:r>
+            <a:r>
+              <a:rPr lang="en-US" sz="1412" dirty="0"/>
+              <a:t>– same as above</a:t>
+            </a:r>
+            <a:br>
+              <a:rPr lang="en-US" sz="1412" dirty="0"/>
+            </a:br>
+            <a:endParaRPr lang="en-US" sz="1412" dirty="0"/>
+          </a:p>
+          <a:p>
+            <a:r>
+              <a:rPr lang="en-US" sz="1412" b="1" dirty="0" err="1"/>
+              <a:t>model_selection</a:t>
+            </a:r>
+            <a:r>
+              <a:rPr lang="en-US" sz="1412" b="1" dirty="0"/>
+              <a:t> </a:t>
+            </a:r>
+            <a:r>
+              <a:rPr lang="en-US" sz="1412" dirty="0"/>
+              <a:t>– includes model selection results for HER conditioned on catch and effort</a:t>
+            </a:r>
+          </a:p>
+          <a:p>
+            <a:endParaRPr lang="en-US" sz="1412" dirty="0"/>
+          </a:p>
+          <a:p>
+            <a:r>
+              <a:rPr lang="en-US" sz="1412" b="1" dirty="0"/>
+              <a:t>retrospective </a:t>
+            </a:r>
+            <a:r>
+              <a:rPr lang="en-US" sz="1412" dirty="0"/>
+              <a:t>– results for the retrospective analysis for HER_bestLS_321, HER_best_condCatch.12_322, and HER_best_condCatch.12_322</a:t>
+            </a:r>
+          </a:p>
+          <a:p>
+            <a:endParaRPr lang="en-US" sz="1412" dirty="0"/>
+          </a:p>
+          <a:p>
+            <a:r>
+              <a:rPr lang="en-US" sz="1412" b="1" dirty="0" err="1"/>
+              <a:t>sensitivity_sigmaM</a:t>
+            </a:r>
+            <a:r>
+              <a:rPr lang="en-US" sz="1412" b="1" dirty="0"/>
+              <a:t> </a:t>
+            </a:r>
+            <a:r>
+              <a:rPr lang="en-US" sz="1412" dirty="0"/>
+              <a:t>– results for sensitivity analysis examining convergence diagnostics and model output for </a:t>
+            </a:r>
+            <a:r>
+              <a:rPr lang="en-US" sz="1412" dirty="0" err="1"/>
+              <a:t>sigmaM</a:t>
+            </a:r>
+            <a:r>
+              <a:rPr lang="en-US" sz="1412" dirty="0"/>
+              <a:t> from 0.05-0.10. </a:t>
+            </a:r>
+            <a:r>
+              <a:rPr lang="en-US" sz="1412" dirty="0" err="1"/>
+              <a:t>sigmaM</a:t>
+            </a:r>
+            <a:r>
+              <a:rPr lang="en-US" sz="1412" dirty="0"/>
+              <a:t> = 0.09 had best convergence diagnostics</a:t>
+            </a:r>
+          </a:p>
+          <a:p>
+            <a:endParaRPr lang="en-US" sz="1412" b="1" dirty="0"/>
+          </a:p>
+          <a:p>
+            <a:r>
+              <a:rPr lang="en-US" sz="1412" b="1" dirty="0" err="1"/>
+              <a:t>reference_points</a:t>
+            </a:r>
+            <a:r>
+              <a:rPr lang="en-US" sz="1412" b="1" dirty="0"/>
+              <a:t> </a:t>
+            </a:r>
+            <a:r>
+              <a:rPr lang="en-US" sz="1412" dirty="0"/>
+              <a:t>– currently only includes saved biological reference point output from posterior samples. This is still under development. Some reference </a:t>
+            </a:r>
+            <a:r>
+              <a:rPr lang="en-US" sz="1412" dirty="0" err="1"/>
+              <a:t>pt</a:t>
+            </a:r>
+            <a:r>
+              <a:rPr lang="en-US" sz="1412" dirty="0"/>
+              <a:t> results also in results/</a:t>
+            </a:r>
+            <a:r>
+              <a:rPr lang="en-US" sz="1412" dirty="0" err="1"/>
+              <a:t>sensitivity_maturity</a:t>
+            </a:r>
+            <a:r>
+              <a:rPr lang="en-US" sz="1412" dirty="0"/>
+              <a:t>/figures that show how maturity assumptions affect reference point assumptions</a:t>
+            </a:r>
+          </a:p>
+          <a:p>
+            <a:endParaRPr lang="en-US" sz="1412" dirty="0"/>
+          </a:p>
+          <a:p>
+            <a:r>
+              <a:rPr lang="en-US" sz="1412" b="1" dirty="0" err="1"/>
+              <a:t>sensitivity_maturity</a:t>
+            </a:r>
+            <a:r>
+              <a:rPr lang="en-US" sz="1412" b="1" dirty="0"/>
+              <a:t> </a:t>
+            </a:r>
+            <a:r>
+              <a:rPr lang="en-US" sz="1412" dirty="0"/>
+              <a:t>– results from sensitivity analysis on maturity comparing a range of a50 and rate of maturation</a:t>
+            </a:r>
+          </a:p>
+          <a:p>
+            <a:endParaRPr lang="en-US" sz="1412" dirty="0"/>
+          </a:p>
+          <a:p>
+            <a:endParaRPr lang="en-US" sz="1412" dirty="0"/>
+          </a:p>
+          <a:p>
+            <a:endParaRPr lang="en-US" sz="1588" dirty="0"/>
+          </a:p>
+        </p:txBody>
+      </p:sp>
+      <p:sp>
+        <p:nvSpPr>
+          <p:cNvPr id="11" name="TextBox 10">
+            <a:extLst>
+              <a:ext uri="{FF2B5EF4-FFF2-40B4-BE49-F238E27FC236}">
+                <a16:creationId xmlns:a16="http://schemas.microsoft.com/office/drawing/2014/main" id="{89BF299B-FC78-41B8-A7E7-BD6D5DF43D56}"/>
+              </a:ext>
+            </a:extLst>
+          </p:cNvPr>
+          <p:cNvSpPr txBox="1"/>
+          <p:nvPr/>
+        </p:nvSpPr>
+        <p:spPr>
+          <a:xfrm>
+            <a:off x="1162647" y="1272408"/>
+            <a:ext cx="1373196" cy="581057"/>
+          </a:xfrm>
+          <a:prstGeom prst="rect">
+            <a:avLst/>
+          </a:prstGeom>
+          <a:noFill/>
+        </p:spPr>
+        <p:txBody>
+          <a:bodyPr wrap="none" rtlCol="0">
+            <a:spAutoFit/>
+          </a:bodyPr>
+          <a:lstStyle/>
+          <a:p>
+            <a:endParaRPr lang="en-US" sz="1588" dirty="0"/>
+          </a:p>
+          <a:p>
+            <a:r>
+              <a:rPr lang="en-US" sz="1588" b="1" dirty="0"/>
+              <a:t>2019_forecast</a:t>
+            </a:r>
+          </a:p>
+        </p:txBody>
+      </p:sp>
+      <p:grpSp>
+        <p:nvGrpSpPr>
+          <p:cNvPr id="14" name="Group 13">
+            <a:extLst>
+              <a:ext uri="{FF2B5EF4-FFF2-40B4-BE49-F238E27FC236}">
+                <a16:creationId xmlns:a16="http://schemas.microsoft.com/office/drawing/2014/main" id="{27F36FB8-05C0-4D55-A44C-16E3186A880A}"/>
+              </a:ext>
+            </a:extLst>
+          </p:cNvPr>
+          <p:cNvGrpSpPr/>
+          <p:nvPr/>
+        </p:nvGrpSpPr>
+        <p:grpSpPr>
+          <a:xfrm>
+            <a:off x="3015591" y="862492"/>
+            <a:ext cx="275374" cy="3040407"/>
+            <a:chOff x="1012371" y="2143552"/>
+            <a:chExt cx="312091" cy="3445795"/>
+          </a:xfrm>
+        </p:grpSpPr>
+        <p:cxnSp>
+          <p:nvCxnSpPr>
+            <p:cNvPr id="15" name="Straight Connector 14">
+              <a:extLst>
+                <a:ext uri="{FF2B5EF4-FFF2-40B4-BE49-F238E27FC236}">
+                  <a16:creationId xmlns:a16="http://schemas.microsoft.com/office/drawing/2014/main" id="{48410155-316A-4587-8C37-80BF0DA8F89D}"/>
+                </a:ext>
+              </a:extLst>
+            </p:cNvPr>
+            <p:cNvCxnSpPr>
+              <a:cxnSpLocks/>
+            </p:cNvCxnSpPr>
+            <p:nvPr/>
+          </p:nvCxnSpPr>
+          <p:spPr>
+            <a:xfrm>
+              <a:off x="1012371" y="2143552"/>
+              <a:ext cx="0" cy="3445795"/>
+            </a:xfrm>
+            <a:prstGeom prst="line">
+              <a:avLst/>
+            </a:prstGeom>
+          </p:spPr>
+          <p:style>
+            <a:lnRef idx="1">
+              <a:schemeClr val="dk1"/>
+            </a:lnRef>
+            <a:fillRef idx="0">
+              <a:schemeClr val="dk1"/>
+            </a:fillRef>
+            <a:effectRef idx="0">
+              <a:schemeClr val="dk1"/>
+            </a:effectRef>
+            <a:fontRef idx="minor">
+              <a:schemeClr val="tx1"/>
+            </a:fontRef>
+          </p:style>
+        </p:cxnSp>
+        <p:cxnSp>
+          <p:nvCxnSpPr>
+            <p:cNvPr id="16" name="Straight Connector 15">
+              <a:extLst>
+                <a:ext uri="{FF2B5EF4-FFF2-40B4-BE49-F238E27FC236}">
+                  <a16:creationId xmlns:a16="http://schemas.microsoft.com/office/drawing/2014/main" id="{8A58D755-B80B-43BC-91FC-25D84962E50D}"/>
+                </a:ext>
+              </a:extLst>
+            </p:cNvPr>
+            <p:cNvCxnSpPr>
+              <a:cxnSpLocks/>
+            </p:cNvCxnSpPr>
+            <p:nvPr/>
+          </p:nvCxnSpPr>
+          <p:spPr>
+            <a:xfrm>
+              <a:off x="1012371" y="2143552"/>
+              <a:ext cx="304800" cy="0"/>
+            </a:xfrm>
+            <a:prstGeom prst="line">
+              <a:avLst/>
+            </a:prstGeom>
+          </p:spPr>
+          <p:style>
+            <a:lnRef idx="1">
+              <a:schemeClr val="dk1"/>
+            </a:lnRef>
+            <a:fillRef idx="0">
+              <a:schemeClr val="dk1"/>
+            </a:fillRef>
+            <a:effectRef idx="0">
+              <a:schemeClr val="dk1"/>
+            </a:effectRef>
+            <a:fontRef idx="minor">
+              <a:schemeClr val="tx1"/>
+            </a:fontRef>
+          </p:style>
+        </p:cxnSp>
+        <p:cxnSp>
+          <p:nvCxnSpPr>
+            <p:cNvPr id="17" name="Straight Connector 16">
+              <a:extLst>
+                <a:ext uri="{FF2B5EF4-FFF2-40B4-BE49-F238E27FC236}">
+                  <a16:creationId xmlns:a16="http://schemas.microsoft.com/office/drawing/2014/main" id="{5104B6B4-F478-42E2-A360-275C84B86A16}"/>
+                </a:ext>
+              </a:extLst>
+            </p:cNvPr>
+            <p:cNvCxnSpPr>
+              <a:cxnSpLocks/>
+            </p:cNvCxnSpPr>
+            <p:nvPr/>
+          </p:nvCxnSpPr>
+          <p:spPr>
+            <a:xfrm>
+              <a:off x="1012371" y="2863807"/>
+              <a:ext cx="304800" cy="0"/>
+            </a:xfrm>
+            <a:prstGeom prst="line">
+              <a:avLst/>
+            </a:prstGeom>
+          </p:spPr>
+          <p:style>
+            <a:lnRef idx="1">
+              <a:schemeClr val="dk1"/>
+            </a:lnRef>
+            <a:fillRef idx="0">
+              <a:schemeClr val="dk1"/>
+            </a:fillRef>
+            <a:effectRef idx="0">
+              <a:schemeClr val="dk1"/>
+            </a:effectRef>
+            <a:fontRef idx="minor">
+              <a:schemeClr val="tx1"/>
+            </a:fontRef>
+          </p:style>
+        </p:cxnSp>
+        <p:cxnSp>
+          <p:nvCxnSpPr>
+            <p:cNvPr id="18" name="Straight Connector 17">
+              <a:extLst>
+                <a:ext uri="{FF2B5EF4-FFF2-40B4-BE49-F238E27FC236}">
+                  <a16:creationId xmlns:a16="http://schemas.microsoft.com/office/drawing/2014/main" id="{83079195-8886-450F-8D63-1387D5E41E03}"/>
+                </a:ext>
+              </a:extLst>
+            </p:cNvPr>
+            <p:cNvCxnSpPr>
+              <a:cxnSpLocks/>
+            </p:cNvCxnSpPr>
+            <p:nvPr/>
+          </p:nvCxnSpPr>
+          <p:spPr>
+            <a:xfrm>
+              <a:off x="1019662" y="3624014"/>
+              <a:ext cx="304800" cy="0"/>
+            </a:xfrm>
+            <a:prstGeom prst="line">
+              <a:avLst/>
+            </a:prstGeom>
+          </p:spPr>
+          <p:style>
+            <a:lnRef idx="1">
+              <a:schemeClr val="dk1"/>
+            </a:lnRef>
+            <a:fillRef idx="0">
+              <a:schemeClr val="dk1"/>
+            </a:fillRef>
+            <a:effectRef idx="0">
+              <a:schemeClr val="dk1"/>
+            </a:effectRef>
+            <a:fontRef idx="minor">
+              <a:schemeClr val="tx1"/>
+            </a:fontRef>
+          </p:style>
+        </p:cxnSp>
+        <p:cxnSp>
+          <p:nvCxnSpPr>
+            <p:cNvPr id="19" name="Straight Connector 18">
+              <a:extLst>
+                <a:ext uri="{FF2B5EF4-FFF2-40B4-BE49-F238E27FC236}">
+                  <a16:creationId xmlns:a16="http://schemas.microsoft.com/office/drawing/2014/main" id="{F003E160-42A2-4119-9742-C7CB0FE9D75E}"/>
+                </a:ext>
+              </a:extLst>
+            </p:cNvPr>
+            <p:cNvCxnSpPr>
+              <a:cxnSpLocks/>
+            </p:cNvCxnSpPr>
+            <p:nvPr/>
+          </p:nvCxnSpPr>
+          <p:spPr>
+            <a:xfrm>
+              <a:off x="1012371" y="5589347"/>
+              <a:ext cx="304800" cy="0"/>
+            </a:xfrm>
+            <a:prstGeom prst="line">
+              <a:avLst/>
+            </a:prstGeom>
+          </p:spPr>
+          <p:style>
+            <a:lnRef idx="1">
+              <a:schemeClr val="dk1"/>
+            </a:lnRef>
+            <a:fillRef idx="0">
+              <a:schemeClr val="dk1"/>
+            </a:fillRef>
+            <a:effectRef idx="0">
+              <a:schemeClr val="dk1"/>
+            </a:effectRef>
+            <a:fontRef idx="minor">
+              <a:schemeClr val="tx1"/>
+            </a:fontRef>
+          </p:style>
+        </p:cxnSp>
+      </p:grpSp>
+      <p:grpSp>
+        <p:nvGrpSpPr>
+          <p:cNvPr id="28" name="Group 27">
+            <a:extLst>
+              <a:ext uri="{FF2B5EF4-FFF2-40B4-BE49-F238E27FC236}">
+                <a16:creationId xmlns:a16="http://schemas.microsoft.com/office/drawing/2014/main" id="{A7B6C621-FD13-4A57-B54F-D1D158430FEE}"/>
+              </a:ext>
+            </a:extLst>
+          </p:cNvPr>
+          <p:cNvGrpSpPr/>
+          <p:nvPr/>
+        </p:nvGrpSpPr>
+        <p:grpSpPr>
+          <a:xfrm>
+            <a:off x="2631392" y="2168321"/>
+            <a:ext cx="398947" cy="452316"/>
+            <a:chOff x="2986416" y="2343090"/>
+            <a:chExt cx="398947" cy="452316"/>
+          </a:xfrm>
+        </p:grpSpPr>
+        <p:cxnSp>
+          <p:nvCxnSpPr>
+            <p:cNvPr id="21" name="Straight Connector 20">
+              <a:extLst>
+                <a:ext uri="{FF2B5EF4-FFF2-40B4-BE49-F238E27FC236}">
+                  <a16:creationId xmlns:a16="http://schemas.microsoft.com/office/drawing/2014/main" id="{9F479048-39FC-4FE6-A687-8E8351E09B52}"/>
+                </a:ext>
+              </a:extLst>
+            </p:cNvPr>
+            <p:cNvCxnSpPr>
+              <a:cxnSpLocks/>
+            </p:cNvCxnSpPr>
+            <p:nvPr/>
+          </p:nvCxnSpPr>
+          <p:spPr>
+            <a:xfrm>
+              <a:off x="2986416" y="2795406"/>
+              <a:ext cx="398947" cy="0"/>
+            </a:xfrm>
+            <a:prstGeom prst="line">
+              <a:avLst/>
+            </a:prstGeom>
+          </p:spPr>
+          <p:style>
+            <a:lnRef idx="1">
+              <a:schemeClr val="dk1"/>
+            </a:lnRef>
+            <a:fillRef idx="0">
+              <a:schemeClr val="dk1"/>
+            </a:fillRef>
+            <a:effectRef idx="0">
+              <a:schemeClr val="dk1"/>
+            </a:effectRef>
+            <a:fontRef idx="minor">
+              <a:schemeClr val="tx1"/>
+            </a:fontRef>
+          </p:style>
+        </p:cxnSp>
+        <p:cxnSp>
+          <p:nvCxnSpPr>
+            <p:cNvPr id="27" name="Straight Connector 26">
+              <a:extLst>
+                <a:ext uri="{FF2B5EF4-FFF2-40B4-BE49-F238E27FC236}">
+                  <a16:creationId xmlns:a16="http://schemas.microsoft.com/office/drawing/2014/main" id="{705FC3D4-E41B-4318-B76A-8D434B30BB37}"/>
+                </a:ext>
+              </a:extLst>
+            </p:cNvPr>
+            <p:cNvCxnSpPr>
+              <a:cxnSpLocks/>
+            </p:cNvCxnSpPr>
+            <p:nvPr/>
+          </p:nvCxnSpPr>
+          <p:spPr>
+            <a:xfrm>
+              <a:off x="2986416" y="2343090"/>
+              <a:ext cx="0" cy="452316"/>
+            </a:xfrm>
+            <a:prstGeom prst="line">
+              <a:avLst/>
+            </a:prstGeom>
+          </p:spPr>
+          <p:style>
+            <a:lnRef idx="1">
+              <a:schemeClr val="dk1"/>
+            </a:lnRef>
+            <a:fillRef idx="0">
+              <a:schemeClr val="dk1"/>
+            </a:fillRef>
+            <a:effectRef idx="0">
+              <a:schemeClr val="dk1"/>
+            </a:effectRef>
+            <a:fontRef idx="minor">
+              <a:schemeClr val="tx1"/>
+            </a:fontRef>
+          </p:style>
+        </p:cxnSp>
+      </p:grpSp>
+      <p:grpSp>
+        <p:nvGrpSpPr>
+          <p:cNvPr id="29" name="Group 28">
+            <a:extLst>
+              <a:ext uri="{FF2B5EF4-FFF2-40B4-BE49-F238E27FC236}">
+                <a16:creationId xmlns:a16="http://schemas.microsoft.com/office/drawing/2014/main" id="{5A25827C-8141-4D0C-A67A-EBCBC5707CC4}"/>
+              </a:ext>
+            </a:extLst>
+          </p:cNvPr>
+          <p:cNvGrpSpPr/>
+          <p:nvPr/>
+        </p:nvGrpSpPr>
+        <p:grpSpPr>
+          <a:xfrm>
+            <a:off x="1025316" y="1716005"/>
+            <a:ext cx="398947" cy="452316"/>
+            <a:chOff x="2986416" y="2343090"/>
+            <a:chExt cx="398947" cy="452316"/>
+          </a:xfrm>
+        </p:grpSpPr>
+        <p:cxnSp>
+          <p:nvCxnSpPr>
+            <p:cNvPr id="30" name="Straight Connector 29">
+              <a:extLst>
+                <a:ext uri="{FF2B5EF4-FFF2-40B4-BE49-F238E27FC236}">
+                  <a16:creationId xmlns:a16="http://schemas.microsoft.com/office/drawing/2014/main" id="{410FD69B-DC54-49A5-851A-4D192C2F67A1}"/>
+                </a:ext>
+              </a:extLst>
+            </p:cNvPr>
+            <p:cNvCxnSpPr>
+              <a:cxnSpLocks/>
+            </p:cNvCxnSpPr>
+            <p:nvPr/>
+          </p:nvCxnSpPr>
+          <p:spPr>
+            <a:xfrm>
+              <a:off x="2986416" y="2795406"/>
+              <a:ext cx="398947" cy="0"/>
+            </a:xfrm>
+            <a:prstGeom prst="line">
+              <a:avLst/>
+            </a:prstGeom>
+          </p:spPr>
+          <p:style>
+            <a:lnRef idx="1">
+              <a:schemeClr val="dk1"/>
+            </a:lnRef>
+            <a:fillRef idx="0">
+              <a:schemeClr val="dk1"/>
+            </a:fillRef>
+            <a:effectRef idx="0">
+              <a:schemeClr val="dk1"/>
+            </a:effectRef>
+            <a:fontRef idx="minor">
+              <a:schemeClr val="tx1"/>
+            </a:fontRef>
+          </p:style>
+        </p:cxnSp>
+        <p:cxnSp>
+          <p:nvCxnSpPr>
+            <p:cNvPr id="31" name="Straight Connector 30">
+              <a:extLst>
+                <a:ext uri="{FF2B5EF4-FFF2-40B4-BE49-F238E27FC236}">
+                  <a16:creationId xmlns:a16="http://schemas.microsoft.com/office/drawing/2014/main" id="{BDACEC9F-7747-4686-BD43-02DD10FD85A0}"/>
+                </a:ext>
+              </a:extLst>
+            </p:cNvPr>
+            <p:cNvCxnSpPr>
+              <a:cxnSpLocks/>
+            </p:cNvCxnSpPr>
+            <p:nvPr/>
+          </p:nvCxnSpPr>
+          <p:spPr>
+            <a:xfrm>
+              <a:off x="2986416" y="2343090"/>
+              <a:ext cx="0" cy="452316"/>
+            </a:xfrm>
+            <a:prstGeom prst="line">
+              <a:avLst/>
+            </a:prstGeom>
+          </p:spPr>
+          <p:style>
+            <a:lnRef idx="1">
+              <a:schemeClr val="dk1"/>
+            </a:lnRef>
+            <a:fillRef idx="0">
+              <a:schemeClr val="dk1"/>
+            </a:fillRef>
+            <a:effectRef idx="0">
+              <a:schemeClr val="dk1"/>
+            </a:effectRef>
+            <a:fontRef idx="minor">
+              <a:schemeClr val="tx1"/>
+            </a:fontRef>
+          </p:style>
+        </p:cxnSp>
+      </p:grpSp>
+      <p:grpSp>
+        <p:nvGrpSpPr>
+          <p:cNvPr id="32" name="Group 31">
+            <a:extLst>
+              <a:ext uri="{FF2B5EF4-FFF2-40B4-BE49-F238E27FC236}">
+                <a16:creationId xmlns:a16="http://schemas.microsoft.com/office/drawing/2014/main" id="{E23113B6-3DA5-4BE6-AA1C-35A815359D28}"/>
+              </a:ext>
+            </a:extLst>
+          </p:cNvPr>
+          <p:cNvGrpSpPr/>
+          <p:nvPr/>
+        </p:nvGrpSpPr>
+        <p:grpSpPr>
+          <a:xfrm>
+            <a:off x="747021" y="1168881"/>
+            <a:ext cx="398947" cy="452316"/>
+            <a:chOff x="2986416" y="2343090"/>
+            <a:chExt cx="398947" cy="452316"/>
+          </a:xfrm>
+        </p:grpSpPr>
+        <p:cxnSp>
+          <p:nvCxnSpPr>
+            <p:cNvPr id="33" name="Straight Connector 32">
+              <a:extLst>
+                <a:ext uri="{FF2B5EF4-FFF2-40B4-BE49-F238E27FC236}">
+                  <a16:creationId xmlns:a16="http://schemas.microsoft.com/office/drawing/2014/main" id="{D1720985-B7F9-486F-B29A-AB788B3A84E0}"/>
+                </a:ext>
+              </a:extLst>
+            </p:cNvPr>
+            <p:cNvCxnSpPr>
+              <a:cxnSpLocks/>
+            </p:cNvCxnSpPr>
+            <p:nvPr/>
+          </p:nvCxnSpPr>
+          <p:spPr>
+            <a:xfrm>
+              <a:off x="2986416" y="2795406"/>
+              <a:ext cx="398947" cy="0"/>
+            </a:xfrm>
+            <a:prstGeom prst="line">
+              <a:avLst/>
+            </a:prstGeom>
+          </p:spPr>
+          <p:style>
+            <a:lnRef idx="1">
+              <a:schemeClr val="dk1"/>
+            </a:lnRef>
+            <a:fillRef idx="0">
+              <a:schemeClr val="dk1"/>
+            </a:fillRef>
+            <a:effectRef idx="0">
+              <a:schemeClr val="dk1"/>
+            </a:effectRef>
+            <a:fontRef idx="minor">
+              <a:schemeClr val="tx1"/>
+            </a:fontRef>
+          </p:style>
+        </p:cxnSp>
+        <p:cxnSp>
+          <p:nvCxnSpPr>
+            <p:cNvPr id="34" name="Straight Connector 33">
+              <a:extLst>
+                <a:ext uri="{FF2B5EF4-FFF2-40B4-BE49-F238E27FC236}">
+                  <a16:creationId xmlns:a16="http://schemas.microsoft.com/office/drawing/2014/main" id="{7FF2B9C5-3A06-4076-AAC5-21AD1B73AB25}"/>
+                </a:ext>
+              </a:extLst>
+            </p:cNvPr>
+            <p:cNvCxnSpPr>
+              <a:cxnSpLocks/>
+            </p:cNvCxnSpPr>
+            <p:nvPr/>
+          </p:nvCxnSpPr>
+          <p:spPr>
+            <a:xfrm>
+              <a:off x="2986416" y="2343090"/>
+              <a:ext cx="0" cy="452316"/>
+            </a:xfrm>
+            <a:prstGeom prst="line">
+              <a:avLst/>
+            </a:prstGeom>
+          </p:spPr>
+          <p:style>
+            <a:lnRef idx="1">
+              <a:schemeClr val="dk1"/>
+            </a:lnRef>
+            <a:fillRef idx="0">
+              <a:schemeClr val="dk1"/>
+            </a:fillRef>
+            <a:effectRef idx="0">
+              <a:schemeClr val="dk1"/>
+            </a:effectRef>
+            <a:fontRef idx="minor">
+              <a:schemeClr val="tx1"/>
+            </a:fontRef>
+          </p:style>
+        </p:cxnSp>
+      </p:grpSp>
       <p:cxnSp>
         <p:nvCxnSpPr>
-          <p:cNvPr id="22" name="Straight Connector 21">
-            <a:extLst>
-              <a:ext uri="{FF2B5EF4-FFF2-40B4-BE49-F238E27FC236}">
-                <a16:creationId xmlns:a16="http://schemas.microsoft.com/office/drawing/2014/main" id="{3293EDA0-B79B-4A03-BD0F-68A4AB87F9B2}"/>
+          <p:cNvPr id="36" name="Straight Connector 35">
+            <a:extLst>
+              <a:ext uri="{FF2B5EF4-FFF2-40B4-BE49-F238E27FC236}">
+                <a16:creationId xmlns:a16="http://schemas.microsoft.com/office/drawing/2014/main" id="{05F80AD6-4682-489D-B8DD-BFE7AC7820BC}"/>
               </a:ext>
             </a:extLst>
           </p:cNvPr>
@@ -5204,7 +6439,7 @@
         </p:nvCxnSpPr>
         <p:spPr>
           <a:xfrm>
-            <a:off x="3091868" y="5074715"/>
+            <a:off x="3015591" y="3023547"/>
             <a:ext cx="268941" cy="0"/>
           </a:xfrm>
           <a:prstGeom prst="line">
@@ -5230,6 +6465,367 @@
     <p:extLst>
       <p:ext uri="{BB962C8B-B14F-4D97-AF65-F5344CB8AC3E}">
         <p14:creationId xmlns:p14="http://schemas.microsoft.com/office/powerpoint/2010/main" val="1545412399"/>
+      </p:ext>
+    </p:extLst>
+  </p:cSld>
+  <p:clrMapOvr>
+    <a:masterClrMapping/>
+  </p:clrMapOvr>
+</p:sld>
+</file>
+
+<file path=ppt/slides/slide7.xml><?xml version="1.0" encoding="utf-8"?>
+<p:sld xmlns:a="http://schemas.openxmlformats.org/drawingml/2006/main" xmlns:r="http://schemas.openxmlformats.org/officeDocument/2006/relationships" xmlns:p="http://schemas.openxmlformats.org/presentationml/2006/main">
+  <p:cSld>
+    <p:spTree>
+      <p:nvGrpSpPr>
+        <p:cNvPr id="1" name=""/>
+        <p:cNvGrpSpPr/>
+        <p:nvPr/>
+      </p:nvGrpSpPr>
+      <p:grpSpPr>
+        <a:xfrm>
+          <a:off x="0" y="0"/>
+          <a:ext cx="0" cy="0"/>
+          <a:chOff x="0" y="0"/>
+          <a:chExt cx="0" cy="0"/>
+        </a:xfrm>
+      </p:grpSpPr>
+      <p:sp>
+        <p:nvSpPr>
+          <p:cNvPr id="4" name="TextBox 3">
+            <a:extLst>
+              <a:ext uri="{FF2B5EF4-FFF2-40B4-BE49-F238E27FC236}">
+                <a16:creationId xmlns:a16="http://schemas.microsoft.com/office/drawing/2014/main" id="{E4419297-D6F3-47B8-B8DF-90EF9C748FEF}"/>
+              </a:ext>
+            </a:extLst>
+          </p:cNvPr>
+          <p:cNvSpPr txBox="1"/>
+          <p:nvPr/>
+        </p:nvSpPr>
+        <p:spPr>
+          <a:xfrm>
+            <a:off x="726987" y="356740"/>
+            <a:ext cx="2731773" cy="825419"/>
+          </a:xfrm>
+          <a:prstGeom prst="rect">
+            <a:avLst/>
+          </a:prstGeom>
+          <a:noFill/>
+        </p:spPr>
+        <p:txBody>
+          <a:bodyPr wrap="none" rtlCol="0">
+            <a:spAutoFit/>
+          </a:bodyPr>
+          <a:lstStyle/>
+          <a:p>
+            <a:r>
+              <a:rPr lang="en-US" sz="1588" dirty="0"/>
+              <a:t>Steps to run a new assessment</a:t>
+            </a:r>
+          </a:p>
+          <a:p>
+            <a:endParaRPr lang="en-US" sz="1588" dirty="0"/>
+          </a:p>
+          <a:p>
+            <a:r>
+              <a:rPr lang="en-US" sz="1588" b="1" dirty="0" err="1"/>
+              <a:t>AlaskaHerring</a:t>
+            </a:r>
+            <a:endParaRPr lang="en-US" sz="1588" b="1" dirty="0"/>
+          </a:p>
+        </p:txBody>
+      </p:sp>
+      <p:sp>
+        <p:nvSpPr>
+          <p:cNvPr id="22" name="TextBox 21">
+            <a:extLst>
+              <a:ext uri="{FF2B5EF4-FFF2-40B4-BE49-F238E27FC236}">
+                <a16:creationId xmlns:a16="http://schemas.microsoft.com/office/drawing/2014/main" id="{144285E2-DCFA-4D5C-943B-2BEF54088325}"/>
+              </a:ext>
+            </a:extLst>
+          </p:cNvPr>
+          <p:cNvSpPr txBox="1"/>
+          <p:nvPr/>
+        </p:nvSpPr>
+        <p:spPr>
+          <a:xfrm>
+            <a:off x="926479" y="1408788"/>
+            <a:ext cx="10107966" cy="3161635"/>
+          </a:xfrm>
+          <a:prstGeom prst="rect">
+            <a:avLst/>
+          </a:prstGeom>
+          <a:noFill/>
+        </p:spPr>
+        <p:txBody>
+          <a:bodyPr wrap="square" rtlCol="0">
+            <a:spAutoFit/>
+          </a:bodyPr>
+          <a:lstStyle/>
+          <a:p>
+            <a:pPr marL="342900" indent="-342900">
+              <a:buAutoNum type="arabicPeriod"/>
+            </a:pPr>
+            <a:r>
+              <a:rPr lang="en-US" sz="1412" dirty="0"/>
+              <a:t>Create new 2020_forecast or 2021_forecast folder</a:t>
+            </a:r>
+          </a:p>
+          <a:p>
+            <a:pPr marL="342900" indent="-342900">
+              <a:buAutoNum type="arabicPeriod"/>
+            </a:pPr>
+            <a:r>
+              <a:rPr lang="en-US" sz="1412" dirty="0"/>
+              <a:t>Create folders for data, r, results, text in forecast folder</a:t>
+            </a:r>
+          </a:p>
+          <a:p>
+            <a:pPr marL="342900" indent="-342900">
+              <a:buAutoNum type="arabicPeriod"/>
+            </a:pPr>
+            <a:r>
+              <a:rPr lang="en-US" sz="1412" dirty="0"/>
+              <a:t>Copy appropriate </a:t>
+            </a:r>
+            <a:r>
+              <a:rPr lang="en-US" sz="1412" dirty="0" err="1"/>
+              <a:t>tpl</a:t>
+            </a:r>
+            <a:r>
+              <a:rPr lang="en-US" sz="1412" dirty="0"/>
+              <a:t>, </a:t>
+            </a:r>
+            <a:r>
+              <a:rPr lang="en-US" sz="1412" dirty="0" err="1"/>
+              <a:t>ctl</a:t>
+            </a:r>
+            <a:r>
+              <a:rPr lang="en-US" sz="1412" dirty="0"/>
+              <a:t>, and </a:t>
+            </a:r>
+            <a:r>
+              <a:rPr lang="en-US" sz="1412" dirty="0" err="1"/>
+              <a:t>dat</a:t>
+            </a:r>
+            <a:r>
+              <a:rPr lang="en-US" sz="1412" dirty="0"/>
+              <a:t> files into correctly named subdirectory of </a:t>
+            </a:r>
+            <a:r>
+              <a:rPr lang="en-US" sz="1412" dirty="0" err="1"/>
+              <a:t>admb</a:t>
+            </a:r>
+            <a:r>
+              <a:rPr lang="en-US" sz="1412" dirty="0"/>
+              <a:t>/</a:t>
+            </a:r>
+          </a:p>
+          <a:p>
+            <a:pPr marL="342900" indent="-342900">
+              <a:buAutoNum type="arabicPeriod"/>
+            </a:pPr>
+            <a:r>
+              <a:rPr lang="en-US" sz="1412" dirty="0"/>
+              <a:t>Copy  correctly formatted LS results into data/ subdirectory</a:t>
+            </a:r>
+          </a:p>
+          <a:p>
+            <a:pPr marL="342900" indent="-342900">
+              <a:buAutoNum type="arabicPeriod"/>
+            </a:pPr>
+            <a:r>
+              <a:rPr lang="en-US" sz="1412" dirty="0"/>
+              <a:t>Use </a:t>
+            </a:r>
+            <a:r>
+              <a:rPr lang="en-US" sz="1412" dirty="0" err="1"/>
+              <a:t>her.R</a:t>
+            </a:r>
+            <a:r>
+              <a:rPr lang="en-US" sz="1412" dirty="0"/>
+              <a:t> to run base model (the </a:t>
+            </a:r>
+            <a:r>
+              <a:rPr lang="en-US" sz="1412" dirty="0" err="1"/>
+              <a:t>tpl</a:t>
+            </a:r>
+            <a:r>
+              <a:rPr lang="en-US" sz="1412" dirty="0"/>
+              <a:t> copied into </a:t>
+            </a:r>
+            <a:r>
+              <a:rPr lang="en-US" sz="1412" dirty="0" err="1"/>
+              <a:t>admb</a:t>
+            </a:r>
+            <a:r>
+              <a:rPr lang="en-US" sz="1412" dirty="0"/>
+              <a:t>/ subdirectory). Be sure to update relevant user inputs in </a:t>
+            </a:r>
+            <a:r>
+              <a:rPr lang="en-US" sz="1412" dirty="0" err="1"/>
+              <a:t>her.R</a:t>
+            </a:r>
+            <a:r>
+              <a:rPr lang="en-US" sz="1412" dirty="0"/>
+              <a:t>.</a:t>
+            </a:r>
+          </a:p>
+          <a:p>
+            <a:pPr marL="342900" indent="-342900">
+              <a:buAutoNum type="arabicPeriod"/>
+            </a:pPr>
+            <a:r>
+              <a:rPr lang="en-US" sz="1412" dirty="0"/>
+              <a:t>If you want to run the traditional loop code, first run </a:t>
+            </a:r>
+            <a:r>
+              <a:rPr lang="en-US" sz="1412" dirty="0" err="1"/>
+              <a:t>pdo_breaks.R</a:t>
+            </a:r>
+            <a:r>
+              <a:rPr lang="en-US" sz="1412" dirty="0"/>
+              <a:t> then </a:t>
+            </a:r>
+            <a:r>
+              <a:rPr lang="en-US" sz="1412" dirty="0" err="1"/>
+              <a:t>model_selection.R</a:t>
+            </a:r>
+            <a:endParaRPr lang="en-US" sz="1412" dirty="0"/>
+          </a:p>
+          <a:p>
+            <a:pPr marL="342900" indent="-342900">
+              <a:buAutoNum type="arabicPeriod"/>
+            </a:pPr>
+            <a:r>
+              <a:rPr lang="en-US" sz="1412" dirty="0"/>
+              <a:t>If you want to examine a range of maturity values, use </a:t>
+            </a:r>
+            <a:r>
+              <a:rPr lang="en-US" sz="1412" dirty="0" err="1"/>
+              <a:t>sensitivity_maturity.R</a:t>
+            </a:r>
+            <a:r>
+              <a:rPr lang="en-US" sz="1412" dirty="0"/>
+              <a:t> – this code (as well as </a:t>
+            </a:r>
+            <a:r>
+              <a:rPr lang="en-US" sz="1412" dirty="0" err="1"/>
+              <a:t>sensitivity_sigmaM</a:t>
+            </a:r>
+            <a:r>
+              <a:rPr lang="en-US" sz="1412" dirty="0"/>
+              <a:t>) could be adapted to evaluate other model parameters and assumptions.</a:t>
+            </a:r>
+          </a:p>
+          <a:p>
+            <a:pPr marL="342900" indent="-342900">
+              <a:buAutoNum type="arabicPeriod"/>
+            </a:pPr>
+            <a:r>
+              <a:rPr lang="en-US" sz="1412" dirty="0"/>
+              <a:t>Any time you want to run </a:t>
+            </a:r>
+            <a:r>
+              <a:rPr lang="en-US" sz="1412" dirty="0" err="1"/>
+              <a:t>her.R</a:t>
+            </a:r>
+            <a:r>
+              <a:rPr lang="en-US" sz="1412" dirty="0"/>
+              <a:t> on a model (e.g. the results of a maturity analysis or model selection), you’ll need to copy the resultant </a:t>
+            </a:r>
+            <a:r>
+              <a:rPr lang="en-US" sz="1412" dirty="0" err="1"/>
+              <a:t>tpl</a:t>
+            </a:r>
+            <a:r>
+              <a:rPr lang="en-US" sz="1412" dirty="0"/>
+              <a:t>, </a:t>
+            </a:r>
+            <a:r>
+              <a:rPr lang="en-US" sz="1412" dirty="0" err="1"/>
+              <a:t>ctl</a:t>
+            </a:r>
+            <a:r>
+              <a:rPr lang="en-US" sz="1412" dirty="0"/>
+              <a:t>, and </a:t>
+            </a:r>
+            <a:r>
+              <a:rPr lang="en-US" sz="1412" dirty="0" err="1"/>
+              <a:t>dat</a:t>
+            </a:r>
+            <a:r>
+              <a:rPr lang="en-US" sz="1412" dirty="0"/>
+              <a:t> files over to a subdirectory of </a:t>
+            </a:r>
+            <a:r>
+              <a:rPr lang="en-US" sz="1412" dirty="0" err="1"/>
+              <a:t>admb</a:t>
+            </a:r>
+            <a:r>
+              <a:rPr lang="en-US" sz="1412"/>
+              <a:t>/</a:t>
+            </a:r>
+            <a:endParaRPr lang="en-US" sz="1412" dirty="0"/>
+          </a:p>
+          <a:p>
+            <a:pPr marL="342900" indent="-342900">
+              <a:buAutoNum type="arabicPeriod"/>
+            </a:pPr>
+            <a:r>
+              <a:rPr lang="en-US" sz="1412" dirty="0"/>
+              <a:t>Take best model and run it through </a:t>
+            </a:r>
+            <a:r>
+              <a:rPr lang="en-US" sz="1412" dirty="0" err="1"/>
+              <a:t>her.R</a:t>
+            </a:r>
+            <a:r>
+              <a:rPr lang="en-US" sz="1412" dirty="0"/>
+              <a:t> again to get final results.</a:t>
+            </a:r>
+          </a:p>
+          <a:p>
+            <a:pPr marL="342900" indent="-342900">
+              <a:buAutoNum type="arabicPeriod"/>
+            </a:pPr>
+            <a:r>
+              <a:rPr lang="en-US" sz="1412" dirty="0"/>
+              <a:t>Run a retrospective analysis on final model using </a:t>
+            </a:r>
+            <a:r>
+              <a:rPr lang="en-US" sz="1412" dirty="0" err="1"/>
+              <a:t>retrospective.R</a:t>
+            </a:r>
+            <a:endParaRPr lang="en-US" sz="1412" dirty="0"/>
+          </a:p>
+          <a:p>
+            <a:pPr marL="342900" indent="-342900">
+              <a:buAutoNum type="arabicPeriod"/>
+            </a:pPr>
+            <a:r>
+              <a:rPr lang="en-US" sz="1412" dirty="0"/>
+              <a:t>Use </a:t>
+            </a:r>
+            <a:r>
+              <a:rPr lang="en-US" sz="1412" dirty="0" err="1"/>
+              <a:t>presentation_figs.R</a:t>
+            </a:r>
+            <a:r>
+              <a:rPr lang="en-US" sz="1412" dirty="0"/>
+              <a:t> to get presentation quality figures.</a:t>
+            </a:r>
+          </a:p>
+          <a:p>
+            <a:endParaRPr lang="en-US" sz="1588" dirty="0"/>
+          </a:p>
+        </p:txBody>
+      </p:sp>
+    </p:spTree>
+    <p:extLst>
+      <p:ext uri="{BB962C8B-B14F-4D97-AF65-F5344CB8AC3E}">
+        <p14:creationId xmlns:p14="http://schemas.microsoft.com/office/powerpoint/2010/main" val="658037882"/>
       </p:ext>
     </p:extLst>
   </p:cSld>

</xml_diff>

<commit_message>
updates from mtg with sherri and sara
</commit_message>
<xml_diff>
--- a/technical_docs/folder_organization.pptx
+++ b/technical_docs/folder_organization.pptx
@@ -3442,8 +3442,8 @@
         </p:nvSpPr>
         <p:spPr>
           <a:xfrm>
-            <a:off x="1538646" y="494747"/>
-            <a:ext cx="9738954" cy="5957015"/>
+            <a:off x="219456" y="201168"/>
+            <a:ext cx="11896344" cy="5693866"/>
           </a:xfrm>
           <a:prstGeom prst="rect">
             <a:avLst/>
@@ -3457,150 +3457,161 @@
           <a:lstStyle/>
           <a:p>
             <a:r>
-              <a:rPr lang="en-US" sz="1588" dirty="0"/>
+              <a:rPr lang="en-US" sz="1400" dirty="0"/>
               <a:t>Model naming conventions:</a:t>
             </a:r>
           </a:p>
           <a:p>
-            <a:endParaRPr lang="en-US" sz="1588" b="1" dirty="0"/>
-          </a:p>
-          <a:p>
-            <a:r>
-              <a:rPr lang="en-US" sz="1588" dirty="0"/>
+            <a:endParaRPr lang="en-US" sz="1400" b="1" dirty="0"/>
+          </a:p>
+          <a:p>
+            <a:r>
+              <a:rPr lang="en-US" sz="1400" dirty="0"/>
               <a:t>Time block parameterization = # survival time blocks, # maturity time blocks, # selectivity time blocks</a:t>
             </a:r>
           </a:p>
           <a:p>
             <a:r>
-              <a:rPr lang="en-US" sz="1588" dirty="0"/>
+              <a:rPr lang="en-US" sz="1400" dirty="0"/>
               <a:t>E.g. HER_123 = 1 survival time block, 2 maturity blocks, 3 survival blocks</a:t>
             </a:r>
           </a:p>
           <a:p>
-            <a:endParaRPr lang="en-US" sz="1588" dirty="0"/>
-          </a:p>
-          <a:p>
-            <a:r>
-              <a:rPr lang="en-US" sz="1588" dirty="0"/>
+            <a:endParaRPr lang="en-US" sz="1400" dirty="0"/>
+          </a:p>
+          <a:p>
+            <a:r>
+              <a:rPr lang="en-US" sz="1400" dirty="0"/>
               <a:t>The model number for model selection is shown before the time block parameterization.</a:t>
             </a:r>
           </a:p>
           <a:p>
             <a:r>
-              <a:rPr lang="en-US" sz="1588" dirty="0"/>
+              <a:rPr lang="en-US" sz="1400" dirty="0"/>
               <a:t>E.g. HER 10_123 = Model 10 with 1 survival time block, 2 maturity blocks, 3 survival blocks</a:t>
             </a:r>
           </a:p>
           <a:p>
-            <a:endParaRPr lang="en-US" sz="1588" b="1" dirty="0"/>
-          </a:p>
-          <a:p>
-            <a:r>
-              <a:rPr lang="en-US" sz="1588" b="1" dirty="0" err="1"/>
+            <a:endParaRPr lang="en-US" sz="1400" b="1" dirty="0"/>
+          </a:p>
+          <a:p>
+            <a:r>
+              <a:rPr lang="en-US" sz="1400" b="1" dirty="0" err="1"/>
               <a:t>HER_bestLS</a:t>
             </a:r>
             <a:r>
-              <a:rPr lang="en-US" sz="1588" b="1" dirty="0"/>
+              <a:rPr lang="en-US" sz="1400" b="1" dirty="0"/>
               <a:t>_### </a:t>
             </a:r>
             <a:r>
-              <a:rPr lang="en-US" sz="1588" dirty="0"/>
+              <a:rPr lang="en-US" sz="1400" dirty="0"/>
               <a:t>= HER model with best-fitting parameterization of LS model by </a:t>
             </a:r>
             <a:r>
-              <a:rPr lang="en-US" sz="1588" dirty="0" err="1"/>
+              <a:rPr lang="en-US" sz="1400" dirty="0" err="1"/>
               <a:t>AICc</a:t>
             </a:r>
-            <a:endParaRPr lang="en-US" sz="1588" dirty="0"/>
-          </a:p>
-          <a:p>
-            <a:endParaRPr lang="en-US" sz="1588" b="1" dirty="0"/>
-          </a:p>
-          <a:p>
-            <a:r>
-              <a:rPr lang="en-US" sz="1588" b="1" dirty="0" err="1"/>
+            <a:endParaRPr lang="en-US" sz="1400" dirty="0"/>
+          </a:p>
+          <a:p>
+            <a:endParaRPr lang="en-US" sz="1400" b="1" dirty="0"/>
+          </a:p>
+          <a:p>
+            <a:r>
+              <a:rPr lang="en-US" sz="1400" b="1" dirty="0" err="1"/>
               <a:t>HER_best_condCatch</a:t>
             </a:r>
             <a:r>
-              <a:rPr lang="en-US" sz="1588" b="1" dirty="0"/>
+              <a:rPr lang="en-US" sz="1400" b="1" dirty="0"/>
               <a:t>.#_### </a:t>
             </a:r>
             <a:r>
-              <a:rPr lang="en-US" sz="1588" dirty="0"/>
+              <a:rPr lang="en-US" sz="1400" dirty="0"/>
               <a:t>= HER model with best-fitting parameterization of HER by AIC when conditioned on catch</a:t>
             </a:r>
           </a:p>
           <a:p>
-            <a:endParaRPr lang="en-US" sz="1588" b="1" dirty="0"/>
-          </a:p>
-          <a:p>
-            <a:r>
-              <a:rPr lang="en-US" sz="1588" b="1" dirty="0" err="1"/>
+            <a:endParaRPr lang="en-US" sz="1400" b="1" dirty="0"/>
+          </a:p>
+          <a:p>
+            <a:r>
+              <a:rPr lang="en-US" sz="1400" b="1" dirty="0" err="1"/>
               <a:t>HER_best_condEffort</a:t>
             </a:r>
             <a:r>
-              <a:rPr lang="en-US" sz="1588" b="1" dirty="0"/>
+              <a:rPr lang="en-US" sz="1400" b="1" dirty="0"/>
               <a:t>.#_### </a:t>
             </a:r>
             <a:r>
-              <a:rPr lang="en-US" sz="1588" dirty="0"/>
+              <a:rPr lang="en-US" sz="1400" dirty="0"/>
               <a:t>= HER model with best-fitting parameterization of HER by AIC when conditioned on effort</a:t>
             </a:r>
           </a:p>
           <a:p>
-            <a:endParaRPr lang="en-US" sz="1588" dirty="0"/>
-          </a:p>
-          <a:p>
-            <a:r>
-              <a:rPr lang="en-US" sz="1588" b="1" dirty="0"/>
+            <a:endParaRPr lang="en-US" sz="1400" dirty="0"/>
+          </a:p>
+          <a:p>
+            <a:r>
+              <a:rPr lang="en-US" sz="1400" b="1" dirty="0"/>
               <a:t>HER_condEffort_fixedmat.4_3 </a:t>
             </a:r>
             <a:r>
-              <a:rPr lang="en-US" sz="1588" dirty="0"/>
+              <a:rPr lang="en-US" sz="1400" dirty="0"/>
               <a:t>= HER model conditioned on effort with a50 fixed at 3.67 (form </a:t>
             </a:r>
             <a:r>
-              <a:rPr lang="en-US" sz="1588" dirty="0" err="1"/>
+              <a:rPr lang="en-US" sz="1400" dirty="0" err="1"/>
               <a:t>FishLife</a:t>
             </a:r>
             <a:r>
-              <a:rPr lang="en-US" sz="1588" dirty="0"/>
-              <a:t>) and a95 = 4.48 from regression provided by SD. One time block for selectivity, 3 blocks estimated for </a:t>
-            </a:r>
-            <a:r>
-              <a:rPr lang="en-US" sz="1588" dirty="0" err="1"/>
-              <a:t>survial</a:t>
-            </a:r>
-            <a:endParaRPr lang="en-US" sz="1588" dirty="0"/>
-          </a:p>
-          <a:p>
-            <a:endParaRPr lang="en-US" sz="1588" b="1" dirty="0"/>
-          </a:p>
-          <a:p>
-            <a:r>
-              <a:rPr lang="en-US" sz="1588" b="1" dirty="0"/>
+              <a:rPr lang="en-US" sz="1400" dirty="0"/>
+              <a:t>) and a95 = 4.48 from regression provided by SD. One time block for selectivity, 3 blocks estimated for survival</a:t>
+            </a:r>
+          </a:p>
+          <a:p>
+            <a:endParaRPr lang="en-US" sz="1400" b="1" dirty="0"/>
+          </a:p>
+          <a:p>
+            <a:r>
+              <a:rPr lang="en-US" sz="1400" b="1" dirty="0"/>
               <a:t>HER_confEffort_1929 </a:t>
             </a:r>
             <a:r>
-              <a:rPr lang="en-US" sz="1588" dirty="0"/>
-              <a:t>= HER model conditioned on effort with data file going back to 1929. Still exploratory, not running well</a:t>
-            </a:r>
-          </a:p>
-          <a:p>
-            <a:endParaRPr lang="en-US" sz="1588" dirty="0"/>
-          </a:p>
-          <a:p>
-            <a:r>
-              <a:rPr lang="en-US" sz="1588" b="1" dirty="0" err="1"/>
+              <a:rPr lang="en-US" sz="1400" dirty="0"/>
+              <a:t>= HER model conditioned on effort with data file going back to 1929. Still exploratory, not running well. STARS on PDO looking pre-1980, you get different time blocks. If you rerun </a:t>
+            </a:r>
+            <a:r>
+              <a:rPr lang="en-US" sz="1400" dirty="0" err="1"/>
+              <a:t>pdo_breaks.R</a:t>
+            </a:r>
+            <a:r>
+              <a:rPr lang="en-US" sz="1400" dirty="0"/>
+              <a:t> for 1929-2018, there are so many breaks that I didn’t killed the process for the loop code before it was finished. No figure output was generated but prelim results in results/</a:t>
+            </a:r>
+            <a:r>
+              <a:rPr lang="en-US" sz="1400" dirty="0" err="1"/>
+              <a:t>model_selection</a:t>
+            </a:r>
+            <a:r>
+              <a:rPr lang="en-US" sz="1400" dirty="0"/>
+              <a:t>/HER_historical_1929. One path forward with this is to choose single (instead of time-varying) parameterization pre-1980 because the model only has catch and catch comps to work with and they may not be informative enough to estimate much. May be informative to use the same natural mortality/selectivity/maturity assumption that were used in Williams and Quinn’s cohort analysis. Historical data from Reid 1971 is in data/. </a:t>
+            </a:r>
+          </a:p>
+          <a:p>
+            <a:endParaRPr lang="en-US" sz="1400" dirty="0"/>
+          </a:p>
+          <a:p>
+            <a:r>
+              <a:rPr lang="en-US" sz="1400" b="1" dirty="0" err="1"/>
               <a:t>HER_mature_catch</a:t>
             </a:r>
             <a:r>
-              <a:rPr lang="en-US" sz="1588" b="1" dirty="0"/>
+              <a:rPr lang="en-US" sz="1400" b="1" dirty="0"/>
               <a:t> </a:t>
             </a:r>
             <a:r>
-              <a:rPr lang="en-US" sz="1588" dirty="0"/>
-              <a:t>= NEW EXPLORATORY MODEL that estimates selectivity from mature not total population. Assumes catch comps come from mature population (catch = 100% mature)</a:t>
+              <a:rPr lang="en-US" sz="1400" dirty="0"/>
+              <a:t>= NEW EXPLORATORY MODEL that estimates selectivity from mature not total population. Assumes catch comps come from mature population (catch = 100% mature). All other models (HER and LS) assume selectivity comes from total population.</a:t>
             </a:r>
           </a:p>
         </p:txBody>
@@ -4752,7 +4763,7 @@
             </a:r>
             <a:r>
               <a:rPr lang="en-US" sz="1412" dirty="0"/>
-              <a:t> of HER (MLE or Bayesian) and compare with LS. Saves output to </a:t>
+              <a:t> of HER (MLE and Bayesian/MCMC) and compare with LS. Saves output to </a:t>
             </a:r>
             <a:r>
               <a:rPr lang="en-US" sz="1412" dirty="0" err="1"/>
@@ -6551,7 +6562,7 @@
         <p:spPr>
           <a:xfrm>
             <a:off x="926479" y="1408788"/>
-            <a:ext cx="10107966" cy="3161635"/>
+            <a:ext cx="10107966" cy="3813544"/>
           </a:xfrm>
           <a:prstGeom prst="rect">
             <a:avLst/>
@@ -6595,7 +6606,7 @@
             </a:r>
             <a:r>
               <a:rPr lang="en-US" sz="1412" dirty="0"/>
-              <a:t>, </a:t>
+              <a:t>, updated </a:t>
             </a:r>
             <a:r>
               <a:rPr lang="en-US" sz="1412" dirty="0" err="1"/>
@@ -6603,7 +6614,7 @@
             </a:r>
             <a:r>
               <a:rPr lang="en-US" sz="1412" dirty="0"/>
-              <a:t>, and </a:t>
+              <a:t>, and updated </a:t>
             </a:r>
             <a:r>
               <a:rPr lang="en-US" sz="1412" dirty="0" err="1"/>
@@ -6619,7 +6630,23 @@
             </a:r>
             <a:r>
               <a:rPr lang="en-US" sz="1412" dirty="0"/>
-              <a:t>/</a:t>
+              <a:t>/ (need to update </a:t>
+            </a:r>
+            <a:r>
+              <a:rPr lang="en-US" sz="1412" dirty="0" err="1"/>
+              <a:t>dat</a:t>
+            </a:r>
+            <a:r>
+              <a:rPr lang="en-US" sz="1412" dirty="0"/>
+              <a:t> file with the new data but also update the terminal years for the time blocks in the </a:t>
+            </a:r>
+            <a:r>
+              <a:rPr lang="en-US" sz="1412" dirty="0" err="1"/>
+              <a:t>ctl</a:t>
+            </a:r>
+            <a:r>
+              <a:rPr lang="en-US" sz="1412" dirty="0"/>
+              <a:t> file)</a:t>
             </a:r>
           </a:p>
           <a:p>
@@ -6661,7 +6688,7 @@
             </a:r>
             <a:r>
               <a:rPr lang="en-US" sz="1412" dirty="0"/>
-              <a:t>/ subdirectory). Be sure to update relevant user inputs in </a:t>
+              <a:t>/ subdirectory – see step 3). Be sure to update relevant user inputs in </a:t>
             </a:r>
             <a:r>
               <a:rPr lang="en-US" sz="1412" dirty="0" err="1"/>
@@ -6692,6 +6719,14 @@
               <a:rPr lang="en-US" sz="1412" dirty="0" err="1"/>
               <a:t>model_selection.R</a:t>
             </a:r>
+            <a:r>
+              <a:rPr lang="en-US" sz="1412" dirty="0"/>
+              <a:t> or if you just wanted to look at time-varying natural mortality (single blocks for maturity and selectivity), use </a:t>
+            </a:r>
+            <a:r>
+              <a:rPr lang="en-US" sz="1412" dirty="0" err="1"/>
+              <a:t>model_selection_natmat.R</a:t>
+            </a:r>
             <a:endParaRPr lang="en-US" sz="1412" dirty="0"/>
           </a:p>
           <a:p>
@@ -6716,7 +6751,15 @@
             </a:r>
             <a:r>
               <a:rPr lang="en-US" sz="1412" dirty="0"/>
-              <a:t>) could be adapted to evaluate other model parameters and assumptions.</a:t>
+              <a:t>) could be adapted to evaluate other model parameters and assumptions. For example, a sensitivity on recruitment compensation ratio (</a:t>
+            </a:r>
+            <a:r>
+              <a:rPr lang="en-US" sz="1412" dirty="0" err="1"/>
+              <a:t>recK</a:t>
+            </a:r>
+            <a:r>
+              <a:rPr lang="en-US" sz="1412" dirty="0"/>
+              <a:t>), which is related to steepness (h)</a:t>
             </a:r>
           </a:p>
           <a:p>
@@ -6764,10 +6807,17 @@
               <a:t>admb</a:t>
             </a:r>
             <a:r>
-              <a:rPr lang="en-US" sz="1412"/>
-              <a:t>/</a:t>
-            </a:r>
-            <a:endParaRPr lang="en-US" sz="1412" dirty="0"/>
+              <a:rPr lang="en-US" sz="1412" dirty="0"/>
+              <a:t>/. The </a:t>
+            </a:r>
+            <a:r>
+              <a:rPr lang="en-US" sz="1412" dirty="0" err="1"/>
+              <a:t>her.R</a:t>
+            </a:r>
+            <a:r>
+              <a:rPr lang="en-US" sz="1412" dirty="0"/>
+              <a:t> is the script file that runs the full MCMC model.</a:t>
+            </a:r>
           </a:p>
           <a:p>
             <a:pPr marL="342900" indent="-342900">

</xml_diff>